<commit_message>
Update Sprint Cadence Diagrams.pptx
</commit_message>
<xml_diff>
--- a/Sprint Cadence Diagrams.pptx
+++ b/Sprint Cadence Diagrams.pptx
@@ -7,6 +7,7 @@
   <p:sldIdLst>
     <p:sldId id="256" r:id="rId2"/>
     <p:sldId id="257" r:id="rId3"/>
+    <p:sldId id="258" r:id="rId4"/>
   </p:sldIdLst>
   <p:sldSz cx="12192000" cy="6858000"/>
   <p:notesSz cx="6858000" cy="9144000"/>
@@ -105,6 +106,11 @@
       </a:defRPr>
     </a:lvl9pPr>
   </p:defaultTextStyle>
+  <p:extLst>
+    <p:ext uri="{EFAFB233-063F-42B5-8137-9DF3F51BA10A}">
+      <p15:sldGuideLst xmlns:p15="http://schemas.microsoft.com/office/powerpoint/2012/main"/>
+    </p:ext>
+  </p:extLst>
 </p:presentation>
 </file>
 
@@ -2769,7 +2775,7 @@
           <a:p>
             <a:fld id="{0C3A9CC2-761E-433C-A323-6D1ABF677EB6}" type="datetimeFigureOut">
               <a:rPr lang="en-US" smtClean="0"/>
-              <a:t>8/20/2020</a:t>
+              <a:t>8/21/2020</a:t>
             </a:fld>
             <a:endParaRPr lang="en-US"/>
           </a:p>
@@ -2967,7 +2973,7 @@
           <a:p>
             <a:fld id="{0C3A9CC2-761E-433C-A323-6D1ABF677EB6}" type="datetimeFigureOut">
               <a:rPr lang="en-US" smtClean="0"/>
-              <a:t>8/20/2020</a:t>
+              <a:t>8/21/2020</a:t>
             </a:fld>
             <a:endParaRPr lang="en-US"/>
           </a:p>
@@ -3175,7 +3181,7 @@
           <a:p>
             <a:fld id="{0C3A9CC2-761E-433C-A323-6D1ABF677EB6}" type="datetimeFigureOut">
               <a:rPr lang="en-US" smtClean="0"/>
-              <a:t>8/20/2020</a:t>
+              <a:t>8/21/2020</a:t>
             </a:fld>
             <a:endParaRPr lang="en-US"/>
           </a:p>
@@ -3373,7 +3379,7 @@
           <a:p>
             <a:fld id="{0C3A9CC2-761E-433C-A323-6D1ABF677EB6}" type="datetimeFigureOut">
               <a:rPr lang="en-US" smtClean="0"/>
-              <a:t>8/20/2020</a:t>
+              <a:t>8/21/2020</a:t>
             </a:fld>
             <a:endParaRPr lang="en-US"/>
           </a:p>
@@ -3648,7 +3654,7 @@
           <a:p>
             <a:fld id="{0C3A9CC2-761E-433C-A323-6D1ABF677EB6}" type="datetimeFigureOut">
               <a:rPr lang="en-US" smtClean="0"/>
-              <a:t>8/20/2020</a:t>
+              <a:t>8/21/2020</a:t>
             </a:fld>
             <a:endParaRPr lang="en-US"/>
           </a:p>
@@ -3913,7 +3919,7 @@
           <a:p>
             <a:fld id="{0C3A9CC2-761E-433C-A323-6D1ABF677EB6}" type="datetimeFigureOut">
               <a:rPr lang="en-US" smtClean="0"/>
-              <a:t>8/20/2020</a:t>
+              <a:t>8/21/2020</a:t>
             </a:fld>
             <a:endParaRPr lang="en-US"/>
           </a:p>
@@ -4325,7 +4331,7 @@
           <a:p>
             <a:fld id="{0C3A9CC2-761E-433C-A323-6D1ABF677EB6}" type="datetimeFigureOut">
               <a:rPr lang="en-US" smtClean="0"/>
-              <a:t>8/20/2020</a:t>
+              <a:t>8/21/2020</a:t>
             </a:fld>
             <a:endParaRPr lang="en-US"/>
           </a:p>
@@ -4466,7 +4472,7 @@
           <a:p>
             <a:fld id="{0C3A9CC2-761E-433C-A323-6D1ABF677EB6}" type="datetimeFigureOut">
               <a:rPr lang="en-US" smtClean="0"/>
-              <a:t>8/20/2020</a:t>
+              <a:t>8/21/2020</a:t>
             </a:fld>
             <a:endParaRPr lang="en-US"/>
           </a:p>
@@ -4579,7 +4585,7 @@
           <a:p>
             <a:fld id="{0C3A9CC2-761E-433C-A323-6D1ABF677EB6}" type="datetimeFigureOut">
               <a:rPr lang="en-US" smtClean="0"/>
-              <a:t>8/20/2020</a:t>
+              <a:t>8/21/2020</a:t>
             </a:fld>
             <a:endParaRPr lang="en-US"/>
           </a:p>
@@ -4890,7 +4896,7 @@
           <a:p>
             <a:fld id="{0C3A9CC2-761E-433C-A323-6D1ABF677EB6}" type="datetimeFigureOut">
               <a:rPr lang="en-US" smtClean="0"/>
-              <a:t>8/20/2020</a:t>
+              <a:t>8/21/2020</a:t>
             </a:fld>
             <a:endParaRPr lang="en-US"/>
           </a:p>
@@ -5178,7 +5184,7 @@
           <a:p>
             <a:fld id="{0C3A9CC2-761E-433C-A323-6D1ABF677EB6}" type="datetimeFigureOut">
               <a:rPr lang="en-US" smtClean="0"/>
-              <a:t>8/20/2020</a:t>
+              <a:t>8/21/2020</a:t>
             </a:fld>
             <a:endParaRPr lang="en-US"/>
           </a:p>
@@ -5419,7 +5425,7 @@
           <a:p>
             <a:fld id="{0C3A9CC2-761E-433C-A323-6D1ABF677EB6}" type="datetimeFigureOut">
               <a:rPr lang="en-US" smtClean="0"/>
-              <a:t>8/20/2020</a:t>
+              <a:t>8/21/2020</a:t>
             </a:fld>
             <a:endParaRPr lang="en-US"/>
           </a:p>
@@ -7019,6 +7025,36 @@
 </p:sld>
 </file>
 
+<file path=ppt/slides/slide3.xml><?xml version="1.0" encoding="utf-8"?>
+<p:sld xmlns:a="http://schemas.openxmlformats.org/drawingml/2006/main" xmlns:r="http://schemas.openxmlformats.org/officeDocument/2006/relationships" xmlns:p="http://schemas.openxmlformats.org/presentationml/2006/main">
+  <p:cSld>
+    <p:spTree>
+      <p:nvGrpSpPr>
+        <p:cNvPr id="1" name=""/>
+        <p:cNvGrpSpPr/>
+        <p:nvPr/>
+      </p:nvGrpSpPr>
+      <p:grpSpPr>
+        <a:xfrm>
+          <a:off x="0" y="0"/>
+          <a:ext cx="0" cy="0"/>
+          <a:chOff x="0" y="0"/>
+          <a:chExt cx="0" cy="0"/>
+        </a:xfrm>
+      </p:grpSpPr>
+    </p:spTree>
+    <p:extLst>
+      <p:ext uri="{BB962C8B-B14F-4D97-AF65-F5344CB8AC3E}">
+        <p14:creationId xmlns:p14="http://schemas.microsoft.com/office/powerpoint/2010/main" val="1447310309"/>
+      </p:ext>
+    </p:extLst>
+  </p:cSld>
+  <p:clrMapOvr>
+    <a:masterClrMapping/>
+  </p:clrMapOvr>
+</p:sld>
+</file>
+
 <file path=ppt/theme/theme1.xml><?xml version="1.0" encoding="utf-8"?>
 <a:theme xmlns:a="http://schemas.openxmlformats.org/drawingml/2006/main" name="Office Theme">
   <a:themeElements>

</xml_diff>

<commit_message>
Added user story diagram
</commit_message>
<xml_diff>
--- a/Sprint Cadence Diagrams.pptx
+++ b/Sprint Cadence Diagrams.pptx
@@ -12,9 +12,11 @@
     <p:sldId id="260" r:id="rId6"/>
     <p:sldId id="261" r:id="rId7"/>
     <p:sldId id="262" r:id="rId8"/>
-    <p:sldId id="263" r:id="rId9"/>
-    <p:sldId id="264" r:id="rId10"/>
-    <p:sldId id="265" r:id="rId11"/>
+    <p:sldId id="266" r:id="rId9"/>
+    <p:sldId id="263" r:id="rId10"/>
+    <p:sldId id="267" r:id="rId11"/>
+    <p:sldId id="264" r:id="rId12"/>
+    <p:sldId id="265" r:id="rId13"/>
   </p:sldIdLst>
   <p:sldSz cx="12192000" cy="6858000"/>
   <p:notesSz cx="6858000" cy="9144000"/>
@@ -6709,6 +6711,173 @@
       </p:grpSpPr>
       <p:sp>
         <p:nvSpPr>
+          <p:cNvPr id="4" name="Rectangle 3">
+            <a:extLst>
+              <a:ext uri="{FF2B5EF4-FFF2-40B4-BE49-F238E27FC236}">
+                <a16:creationId xmlns:a16="http://schemas.microsoft.com/office/drawing/2014/main" id="{8B719503-64CC-460D-A215-0E70648D2823}"/>
+              </a:ext>
+            </a:extLst>
+          </p:cNvPr>
+          <p:cNvSpPr/>
+          <p:nvPr/>
+        </p:nvSpPr>
+        <p:spPr>
+          <a:xfrm>
+            <a:off x="2817341" y="1103870"/>
+            <a:ext cx="4357816" cy="2207741"/>
+          </a:xfrm>
+          <a:prstGeom prst="rect">
+            <a:avLst/>
+          </a:prstGeom>
+          <a:solidFill>
+            <a:schemeClr val="bg2"/>
+          </a:solidFill>
+        </p:spPr>
+        <p:style>
+          <a:lnRef idx="1">
+            <a:schemeClr val="accent3"/>
+          </a:lnRef>
+          <a:fillRef idx="2">
+            <a:schemeClr val="accent3"/>
+          </a:fillRef>
+          <a:effectRef idx="1">
+            <a:schemeClr val="accent3"/>
+          </a:effectRef>
+          <a:fontRef idx="minor">
+            <a:schemeClr val="dk1"/>
+          </a:fontRef>
+        </p:style>
+        <p:txBody>
+          <a:bodyPr rtlCol="0" anchor="ctr"/>
+          <a:lstStyle/>
+          <a:p>
+            <a:pPr algn="ctr"/>
+            <a:endParaRPr lang="en-US"/>
+          </a:p>
+        </p:txBody>
+      </p:sp>
+      <p:pic>
+        <p:nvPicPr>
+          <p:cNvPr id="3" name="Picture 2">
+            <a:extLst>
+              <a:ext uri="{FF2B5EF4-FFF2-40B4-BE49-F238E27FC236}">
+                <a16:creationId xmlns:a16="http://schemas.microsoft.com/office/drawing/2014/main" id="{B4728816-7E3B-48B0-9DDC-D4FF5E79257F}"/>
+              </a:ext>
+            </a:extLst>
+          </p:cNvPr>
+          <p:cNvPicPr>
+            <a:picLocks noChangeAspect="1"/>
+          </p:cNvPicPr>
+          <p:nvPr/>
+        </p:nvPicPr>
+        <p:blipFill>
+          <a:blip r:embed="rId2"/>
+          <a:stretch>
+            <a:fillRect/>
+          </a:stretch>
+        </p:blipFill>
+        <p:spPr>
+          <a:xfrm>
+            <a:off x="2960359" y="1230746"/>
+            <a:ext cx="3932195" cy="1899632"/>
+          </a:xfrm>
+          <a:prstGeom prst="rect">
+            <a:avLst/>
+          </a:prstGeom>
+        </p:spPr>
+      </p:pic>
+    </p:spTree>
+    <p:extLst>
+      <p:ext uri="{BB962C8B-B14F-4D97-AF65-F5344CB8AC3E}">
+        <p14:creationId xmlns:p14="http://schemas.microsoft.com/office/powerpoint/2010/main" val="1151581452"/>
+      </p:ext>
+    </p:extLst>
+  </p:cSld>
+  <p:clrMapOvr>
+    <a:masterClrMapping/>
+  </p:clrMapOvr>
+</p:sld>
+</file>
+
+<file path=ppt/slides/slide11.xml><?xml version="1.0" encoding="utf-8"?>
+<p:sld xmlns:a="http://schemas.openxmlformats.org/drawingml/2006/main" xmlns:r="http://schemas.openxmlformats.org/officeDocument/2006/relationships" xmlns:p="http://schemas.openxmlformats.org/presentationml/2006/main">
+  <p:cSld>
+    <p:spTree>
+      <p:nvGrpSpPr>
+        <p:cNvPr id="1" name=""/>
+        <p:cNvGrpSpPr/>
+        <p:nvPr/>
+      </p:nvGrpSpPr>
+      <p:grpSpPr>
+        <a:xfrm>
+          <a:off x="0" y="0"/>
+          <a:ext cx="0" cy="0"/>
+          <a:chOff x="0" y="0"/>
+          <a:chExt cx="0" cy="0"/>
+        </a:xfrm>
+      </p:grpSpPr>
+      <p:pic>
+        <p:nvPicPr>
+          <p:cNvPr id="3" name="Picture 2">
+            <a:extLst>
+              <a:ext uri="{FF2B5EF4-FFF2-40B4-BE49-F238E27FC236}">
+                <a16:creationId xmlns:a16="http://schemas.microsoft.com/office/drawing/2014/main" id="{4D048467-7067-4E38-B536-700691661111}"/>
+              </a:ext>
+            </a:extLst>
+          </p:cNvPr>
+          <p:cNvPicPr>
+            <a:picLocks noChangeAspect="1"/>
+          </p:cNvPicPr>
+          <p:nvPr/>
+        </p:nvPicPr>
+        <p:blipFill>
+          <a:blip r:embed="rId2"/>
+          <a:stretch>
+            <a:fillRect/>
+          </a:stretch>
+        </p:blipFill>
+        <p:spPr>
+          <a:xfrm>
+            <a:off x="1919756" y="1359243"/>
+            <a:ext cx="5118553" cy="2317355"/>
+          </a:xfrm>
+          <a:prstGeom prst="rect">
+            <a:avLst/>
+          </a:prstGeom>
+        </p:spPr>
+      </p:pic>
+    </p:spTree>
+    <p:extLst>
+      <p:ext uri="{BB962C8B-B14F-4D97-AF65-F5344CB8AC3E}">
+        <p14:creationId xmlns:p14="http://schemas.microsoft.com/office/powerpoint/2010/main" val="2441154599"/>
+      </p:ext>
+    </p:extLst>
+  </p:cSld>
+  <p:clrMapOvr>
+    <a:masterClrMapping/>
+  </p:clrMapOvr>
+</p:sld>
+</file>
+
+<file path=ppt/slides/slide12.xml><?xml version="1.0" encoding="utf-8"?>
+<p:sld xmlns:a="http://schemas.openxmlformats.org/drawingml/2006/main" xmlns:r="http://schemas.openxmlformats.org/officeDocument/2006/relationships" xmlns:p="http://schemas.openxmlformats.org/presentationml/2006/main">
+  <p:cSld>
+    <p:spTree>
+      <p:nvGrpSpPr>
+        <p:cNvPr id="1" name=""/>
+        <p:cNvGrpSpPr/>
+        <p:nvPr/>
+      </p:nvGrpSpPr>
+      <p:grpSpPr>
+        <a:xfrm>
+          <a:off x="0" y="0"/>
+          <a:ext cx="0" cy="0"/>
+          <a:chOff x="0" y="0"/>
+          <a:chExt cx="0" cy="0"/>
+        </a:xfrm>
+      </p:grpSpPr>
+      <p:sp>
+        <p:nvSpPr>
           <p:cNvPr id="3" name="Rectangle 2">
             <a:extLst>
               <a:ext uri="{FF2B5EF4-FFF2-40B4-BE49-F238E27FC236}">
@@ -16129,6 +16298,66 @@
           <a:chExt cx="0" cy="0"/>
         </a:xfrm>
       </p:grpSpPr>
+      <p:pic>
+        <p:nvPicPr>
+          <p:cNvPr id="3" name="Picture 2">
+            <a:extLst>
+              <a:ext uri="{FF2B5EF4-FFF2-40B4-BE49-F238E27FC236}">
+                <a16:creationId xmlns:a16="http://schemas.microsoft.com/office/drawing/2014/main" id="{3DE35BC6-0B88-4BA7-B633-CBDCF0F5EEAC}"/>
+              </a:ext>
+            </a:extLst>
+          </p:cNvPr>
+          <p:cNvPicPr>
+            <a:picLocks noChangeAspect="1"/>
+          </p:cNvPicPr>
+          <p:nvPr/>
+        </p:nvPicPr>
+        <p:blipFill>
+          <a:blip r:embed="rId2"/>
+          <a:stretch>
+            <a:fillRect/>
+          </a:stretch>
+        </p:blipFill>
+        <p:spPr>
+          <a:xfrm>
+            <a:off x="2512540" y="1460156"/>
+            <a:ext cx="4193060" cy="2419502"/>
+          </a:xfrm>
+          <a:prstGeom prst="rect">
+            <a:avLst/>
+          </a:prstGeom>
+        </p:spPr>
+      </p:pic>
+    </p:spTree>
+    <p:extLst>
+      <p:ext uri="{BB962C8B-B14F-4D97-AF65-F5344CB8AC3E}">
+        <p14:creationId xmlns:p14="http://schemas.microsoft.com/office/powerpoint/2010/main" val="1114236191"/>
+      </p:ext>
+    </p:extLst>
+  </p:cSld>
+  <p:clrMapOvr>
+    <a:masterClrMapping/>
+  </p:clrMapOvr>
+</p:sld>
+</file>
+
+<file path=ppt/slides/slide9.xml><?xml version="1.0" encoding="utf-8"?>
+<p:sld xmlns:a="http://schemas.openxmlformats.org/drawingml/2006/main" xmlns:r="http://schemas.openxmlformats.org/officeDocument/2006/relationships" xmlns:p="http://schemas.openxmlformats.org/presentationml/2006/main">
+  <p:cSld>
+    <p:spTree>
+      <p:nvGrpSpPr>
+        <p:cNvPr id="1" name=""/>
+        <p:cNvGrpSpPr/>
+        <p:nvPr/>
+      </p:nvGrpSpPr>
+      <p:grpSpPr>
+        <a:xfrm>
+          <a:off x="0" y="0"/>
+          <a:ext cx="0" cy="0"/>
+          <a:chOff x="0" y="0"/>
+          <a:chExt cx="0" cy="0"/>
+        </a:xfrm>
+      </p:grpSpPr>
       <p:grpSp>
         <p:nvGrpSpPr>
           <p:cNvPr id="91" name="Group 90">
@@ -18226,42 +18455,12 @@
           </p:txBody>
         </p:sp>
       </p:grpSp>
-    </p:spTree>
-    <p:extLst>
-      <p:ext uri="{BB962C8B-B14F-4D97-AF65-F5344CB8AC3E}">
-        <p14:creationId xmlns:p14="http://schemas.microsoft.com/office/powerpoint/2010/main" val="1786796278"/>
-      </p:ext>
-    </p:extLst>
-  </p:cSld>
-  <p:clrMapOvr>
-    <a:masterClrMapping/>
-  </p:clrMapOvr>
-</p:sld>
-</file>
-
-<file path=ppt/slides/slide9.xml><?xml version="1.0" encoding="utf-8"?>
-<p:sld xmlns:a="http://schemas.openxmlformats.org/drawingml/2006/main" xmlns:r="http://schemas.openxmlformats.org/officeDocument/2006/relationships" xmlns:p="http://schemas.openxmlformats.org/presentationml/2006/main">
-  <p:cSld>
-    <p:spTree>
-      <p:nvGrpSpPr>
-        <p:cNvPr id="1" name=""/>
-        <p:cNvGrpSpPr/>
-        <p:nvPr/>
-      </p:nvGrpSpPr>
-      <p:grpSpPr>
-        <a:xfrm>
-          <a:off x="0" y="0"/>
-          <a:ext cx="0" cy="0"/>
-          <a:chOff x="0" y="0"/>
-          <a:chExt cx="0" cy="0"/>
-        </a:xfrm>
-      </p:grpSpPr>
       <p:pic>
         <p:nvPicPr>
-          <p:cNvPr id="3" name="Picture 2">
-            <a:extLst>
-              <a:ext uri="{FF2B5EF4-FFF2-40B4-BE49-F238E27FC236}">
-                <a16:creationId xmlns:a16="http://schemas.microsoft.com/office/drawing/2014/main" id="{4D048467-7067-4E38-B536-700691661111}"/>
+          <p:cNvPr id="5" name="Picture 4">
+            <a:extLst>
+              <a:ext uri="{FF2B5EF4-FFF2-40B4-BE49-F238E27FC236}">
+                <a16:creationId xmlns:a16="http://schemas.microsoft.com/office/drawing/2014/main" id="{2FB4ABE6-7646-486D-8FB7-259C8BEF3B8A}"/>
               </a:ext>
             </a:extLst>
           </p:cNvPr>
@@ -18278,18 +18477,1881 @@
         </p:blipFill>
         <p:spPr>
           <a:xfrm>
-            <a:off x="1919756" y="1359243"/>
-            <a:ext cx="5118553" cy="2317355"/>
+            <a:off x="1394966" y="178542"/>
+            <a:ext cx="548688" cy="536494"/>
           </a:xfrm>
           <a:prstGeom prst="rect">
             <a:avLst/>
           </a:prstGeom>
         </p:spPr>
       </p:pic>
+      <p:sp>
+        <p:nvSpPr>
+          <p:cNvPr id="7" name="Freeform 225">
+            <a:extLst>
+              <a:ext uri="{FF2B5EF4-FFF2-40B4-BE49-F238E27FC236}">
+                <a16:creationId xmlns:a16="http://schemas.microsoft.com/office/drawing/2014/main" id="{802E9C95-315D-4FF0-ACD1-7AD17239731C}"/>
+              </a:ext>
+            </a:extLst>
+          </p:cNvPr>
+          <p:cNvSpPr>
+            <a:spLocks noEditPoints="1"/>
+          </p:cNvSpPr>
+          <p:nvPr/>
+        </p:nvSpPr>
+        <p:spPr bwMode="auto">
+          <a:xfrm>
+            <a:off x="3877712" y="178542"/>
+            <a:ext cx="549124" cy="536674"/>
+          </a:xfrm>
+          <a:custGeom>
+            <a:avLst/>
+            <a:gdLst>
+              <a:gd name="T0" fmla="*/ 282 w 288"/>
+              <a:gd name="T1" fmla="*/ 288 h 288"/>
+              <a:gd name="T2" fmla="*/ 6 w 288"/>
+              <a:gd name="T3" fmla="*/ 288 h 288"/>
+              <a:gd name="T4" fmla="*/ 0 w 288"/>
+              <a:gd name="T5" fmla="*/ 282 h 288"/>
+              <a:gd name="T6" fmla="*/ 12 w 288"/>
+              <a:gd name="T7" fmla="*/ 231 h 288"/>
+              <a:gd name="T8" fmla="*/ 93 w 288"/>
+              <a:gd name="T9" fmla="*/ 187 h 288"/>
+              <a:gd name="T10" fmla="*/ 108 w 288"/>
+              <a:gd name="T11" fmla="*/ 181 h 288"/>
+              <a:gd name="T12" fmla="*/ 108 w 288"/>
+              <a:gd name="T13" fmla="*/ 152 h 288"/>
+              <a:gd name="T14" fmla="*/ 90 w 288"/>
+              <a:gd name="T15" fmla="*/ 117 h 288"/>
+              <a:gd name="T16" fmla="*/ 84 w 288"/>
+              <a:gd name="T17" fmla="*/ 106 h 288"/>
+              <a:gd name="T18" fmla="*/ 89 w 288"/>
+              <a:gd name="T19" fmla="*/ 81 h 288"/>
+              <a:gd name="T20" fmla="*/ 88 w 288"/>
+              <a:gd name="T21" fmla="*/ 79 h 288"/>
+              <a:gd name="T22" fmla="*/ 87 w 288"/>
+              <a:gd name="T23" fmla="*/ 26 h 288"/>
+              <a:gd name="T24" fmla="*/ 104 w 288"/>
+              <a:gd name="T25" fmla="*/ 18 h 288"/>
+              <a:gd name="T26" fmla="*/ 155 w 288"/>
+              <a:gd name="T27" fmla="*/ 0 h 288"/>
+              <a:gd name="T28" fmla="*/ 210 w 288"/>
+              <a:gd name="T29" fmla="*/ 28 h 288"/>
+              <a:gd name="T30" fmla="*/ 200 w 288"/>
+              <a:gd name="T31" fmla="*/ 78 h 288"/>
+              <a:gd name="T32" fmla="*/ 199 w 288"/>
+              <a:gd name="T33" fmla="*/ 81 h 288"/>
+              <a:gd name="T34" fmla="*/ 204 w 288"/>
+              <a:gd name="T35" fmla="*/ 106 h 288"/>
+              <a:gd name="T36" fmla="*/ 198 w 288"/>
+              <a:gd name="T37" fmla="*/ 117 h 288"/>
+              <a:gd name="T38" fmla="*/ 180 w 288"/>
+              <a:gd name="T39" fmla="*/ 152 h 288"/>
+              <a:gd name="T40" fmla="*/ 180 w 288"/>
+              <a:gd name="T41" fmla="*/ 181 h 288"/>
+              <a:gd name="T42" fmla="*/ 194 w 288"/>
+              <a:gd name="T43" fmla="*/ 187 h 288"/>
+              <a:gd name="T44" fmla="*/ 275 w 288"/>
+              <a:gd name="T45" fmla="*/ 231 h 288"/>
+              <a:gd name="T46" fmla="*/ 288 w 288"/>
+              <a:gd name="T47" fmla="*/ 282 h 288"/>
+              <a:gd name="T48" fmla="*/ 282 w 288"/>
+              <a:gd name="T49" fmla="*/ 288 h 288"/>
+              <a:gd name="T50" fmla="*/ 12 w 288"/>
+              <a:gd name="T51" fmla="*/ 276 h 288"/>
+              <a:gd name="T52" fmla="*/ 275 w 288"/>
+              <a:gd name="T53" fmla="*/ 276 h 288"/>
+              <a:gd name="T54" fmla="*/ 264 w 288"/>
+              <a:gd name="T55" fmla="*/ 236 h 288"/>
+              <a:gd name="T56" fmla="*/ 190 w 288"/>
+              <a:gd name="T57" fmla="*/ 198 h 288"/>
+              <a:gd name="T58" fmla="*/ 172 w 288"/>
+              <a:gd name="T59" fmla="*/ 191 h 288"/>
+              <a:gd name="T60" fmla="*/ 168 w 288"/>
+              <a:gd name="T61" fmla="*/ 185 h 288"/>
+              <a:gd name="T62" fmla="*/ 168 w 288"/>
+              <a:gd name="T63" fmla="*/ 149 h 288"/>
+              <a:gd name="T64" fmla="*/ 170 w 288"/>
+              <a:gd name="T65" fmla="*/ 144 h 288"/>
+              <a:gd name="T66" fmla="*/ 186 w 288"/>
+              <a:gd name="T67" fmla="*/ 113 h 288"/>
+              <a:gd name="T68" fmla="*/ 190 w 288"/>
+              <a:gd name="T69" fmla="*/ 108 h 288"/>
+              <a:gd name="T70" fmla="*/ 192 w 288"/>
+              <a:gd name="T71" fmla="*/ 95 h 288"/>
+              <a:gd name="T72" fmla="*/ 189 w 288"/>
+              <a:gd name="T73" fmla="*/ 89 h 288"/>
+              <a:gd name="T74" fmla="*/ 186 w 288"/>
+              <a:gd name="T75" fmla="*/ 83 h 288"/>
+              <a:gd name="T76" fmla="*/ 189 w 288"/>
+              <a:gd name="T77" fmla="*/ 74 h 288"/>
+              <a:gd name="T78" fmla="*/ 198 w 288"/>
+              <a:gd name="T79" fmla="*/ 31 h 288"/>
+              <a:gd name="T80" fmla="*/ 154 w 288"/>
+              <a:gd name="T81" fmla="*/ 12 h 288"/>
+              <a:gd name="T82" fmla="*/ 113 w 288"/>
+              <a:gd name="T83" fmla="*/ 25 h 288"/>
+              <a:gd name="T84" fmla="*/ 108 w 288"/>
+              <a:gd name="T85" fmla="*/ 29 h 288"/>
+              <a:gd name="T86" fmla="*/ 97 w 288"/>
+              <a:gd name="T87" fmla="*/ 34 h 288"/>
+              <a:gd name="T88" fmla="*/ 100 w 288"/>
+              <a:gd name="T89" fmla="*/ 75 h 288"/>
+              <a:gd name="T90" fmla="*/ 102 w 288"/>
+              <a:gd name="T91" fmla="*/ 83 h 288"/>
+              <a:gd name="T92" fmla="*/ 98 w 288"/>
+              <a:gd name="T93" fmla="*/ 89 h 288"/>
+              <a:gd name="T94" fmla="*/ 95 w 288"/>
+              <a:gd name="T95" fmla="*/ 95 h 288"/>
+              <a:gd name="T96" fmla="*/ 97 w 288"/>
+              <a:gd name="T97" fmla="*/ 108 h 288"/>
+              <a:gd name="T98" fmla="*/ 102 w 288"/>
+              <a:gd name="T99" fmla="*/ 113 h 288"/>
+              <a:gd name="T100" fmla="*/ 117 w 288"/>
+              <a:gd name="T101" fmla="*/ 144 h 288"/>
+              <a:gd name="T102" fmla="*/ 120 w 288"/>
+              <a:gd name="T103" fmla="*/ 149 h 288"/>
+              <a:gd name="T104" fmla="*/ 120 w 288"/>
+              <a:gd name="T105" fmla="*/ 185 h 288"/>
+              <a:gd name="T106" fmla="*/ 116 w 288"/>
+              <a:gd name="T107" fmla="*/ 191 h 288"/>
+              <a:gd name="T108" fmla="*/ 97 w 288"/>
+              <a:gd name="T109" fmla="*/ 198 h 288"/>
+              <a:gd name="T110" fmla="*/ 23 w 288"/>
+              <a:gd name="T111" fmla="*/ 236 h 288"/>
+              <a:gd name="T112" fmla="*/ 12 w 288"/>
+              <a:gd name="T113" fmla="*/ 276 h 288"/>
+            </a:gdLst>
+            <a:ahLst/>
+            <a:cxnLst>
+              <a:cxn ang="0">
+                <a:pos x="T0" y="T1"/>
+              </a:cxn>
+              <a:cxn ang="0">
+                <a:pos x="T2" y="T3"/>
+              </a:cxn>
+              <a:cxn ang="0">
+                <a:pos x="T4" y="T5"/>
+              </a:cxn>
+              <a:cxn ang="0">
+                <a:pos x="T6" y="T7"/>
+              </a:cxn>
+              <a:cxn ang="0">
+                <a:pos x="T8" y="T9"/>
+              </a:cxn>
+              <a:cxn ang="0">
+                <a:pos x="T10" y="T11"/>
+              </a:cxn>
+              <a:cxn ang="0">
+                <a:pos x="T12" y="T13"/>
+              </a:cxn>
+              <a:cxn ang="0">
+                <a:pos x="T14" y="T15"/>
+              </a:cxn>
+              <a:cxn ang="0">
+                <a:pos x="T16" y="T17"/>
+              </a:cxn>
+              <a:cxn ang="0">
+                <a:pos x="T18" y="T19"/>
+              </a:cxn>
+              <a:cxn ang="0">
+                <a:pos x="T20" y="T21"/>
+              </a:cxn>
+              <a:cxn ang="0">
+                <a:pos x="T22" y="T23"/>
+              </a:cxn>
+              <a:cxn ang="0">
+                <a:pos x="T24" y="T25"/>
+              </a:cxn>
+              <a:cxn ang="0">
+                <a:pos x="T26" y="T27"/>
+              </a:cxn>
+              <a:cxn ang="0">
+                <a:pos x="T28" y="T29"/>
+              </a:cxn>
+              <a:cxn ang="0">
+                <a:pos x="T30" y="T31"/>
+              </a:cxn>
+              <a:cxn ang="0">
+                <a:pos x="T32" y="T33"/>
+              </a:cxn>
+              <a:cxn ang="0">
+                <a:pos x="T34" y="T35"/>
+              </a:cxn>
+              <a:cxn ang="0">
+                <a:pos x="T36" y="T37"/>
+              </a:cxn>
+              <a:cxn ang="0">
+                <a:pos x="T38" y="T39"/>
+              </a:cxn>
+              <a:cxn ang="0">
+                <a:pos x="T40" y="T41"/>
+              </a:cxn>
+              <a:cxn ang="0">
+                <a:pos x="T42" y="T43"/>
+              </a:cxn>
+              <a:cxn ang="0">
+                <a:pos x="T44" y="T45"/>
+              </a:cxn>
+              <a:cxn ang="0">
+                <a:pos x="T46" y="T47"/>
+              </a:cxn>
+              <a:cxn ang="0">
+                <a:pos x="T48" y="T49"/>
+              </a:cxn>
+              <a:cxn ang="0">
+                <a:pos x="T50" y="T51"/>
+              </a:cxn>
+              <a:cxn ang="0">
+                <a:pos x="T52" y="T53"/>
+              </a:cxn>
+              <a:cxn ang="0">
+                <a:pos x="T54" y="T55"/>
+              </a:cxn>
+              <a:cxn ang="0">
+                <a:pos x="T56" y="T57"/>
+              </a:cxn>
+              <a:cxn ang="0">
+                <a:pos x="T58" y="T59"/>
+              </a:cxn>
+              <a:cxn ang="0">
+                <a:pos x="T60" y="T61"/>
+              </a:cxn>
+              <a:cxn ang="0">
+                <a:pos x="T62" y="T63"/>
+              </a:cxn>
+              <a:cxn ang="0">
+                <a:pos x="T64" y="T65"/>
+              </a:cxn>
+              <a:cxn ang="0">
+                <a:pos x="T66" y="T67"/>
+              </a:cxn>
+              <a:cxn ang="0">
+                <a:pos x="T68" y="T69"/>
+              </a:cxn>
+              <a:cxn ang="0">
+                <a:pos x="T70" y="T71"/>
+              </a:cxn>
+              <a:cxn ang="0">
+                <a:pos x="T72" y="T73"/>
+              </a:cxn>
+              <a:cxn ang="0">
+                <a:pos x="T74" y="T75"/>
+              </a:cxn>
+              <a:cxn ang="0">
+                <a:pos x="T76" y="T77"/>
+              </a:cxn>
+              <a:cxn ang="0">
+                <a:pos x="T78" y="T79"/>
+              </a:cxn>
+              <a:cxn ang="0">
+                <a:pos x="T80" y="T81"/>
+              </a:cxn>
+              <a:cxn ang="0">
+                <a:pos x="T82" y="T83"/>
+              </a:cxn>
+              <a:cxn ang="0">
+                <a:pos x="T84" y="T85"/>
+              </a:cxn>
+              <a:cxn ang="0">
+                <a:pos x="T86" y="T87"/>
+              </a:cxn>
+              <a:cxn ang="0">
+                <a:pos x="T88" y="T89"/>
+              </a:cxn>
+              <a:cxn ang="0">
+                <a:pos x="T90" y="T91"/>
+              </a:cxn>
+              <a:cxn ang="0">
+                <a:pos x="T92" y="T93"/>
+              </a:cxn>
+              <a:cxn ang="0">
+                <a:pos x="T94" y="T95"/>
+              </a:cxn>
+              <a:cxn ang="0">
+                <a:pos x="T96" y="T97"/>
+              </a:cxn>
+              <a:cxn ang="0">
+                <a:pos x="T98" y="T99"/>
+              </a:cxn>
+              <a:cxn ang="0">
+                <a:pos x="T100" y="T101"/>
+              </a:cxn>
+              <a:cxn ang="0">
+                <a:pos x="T102" y="T103"/>
+              </a:cxn>
+              <a:cxn ang="0">
+                <a:pos x="T104" y="T105"/>
+              </a:cxn>
+              <a:cxn ang="0">
+                <a:pos x="T106" y="T107"/>
+              </a:cxn>
+              <a:cxn ang="0">
+                <a:pos x="T108" y="T109"/>
+              </a:cxn>
+              <a:cxn ang="0">
+                <a:pos x="T110" y="T111"/>
+              </a:cxn>
+              <a:cxn ang="0">
+                <a:pos x="T112" y="T113"/>
+              </a:cxn>
+            </a:cxnLst>
+            <a:rect l="0" t="0" r="r" b="b"/>
+            <a:pathLst>
+              <a:path w="288" h="288">
+                <a:moveTo>
+                  <a:pt x="282" y="288"/>
+                </a:moveTo>
+                <a:cubicBezTo>
+                  <a:pt x="6" y="288"/>
+                  <a:pt x="6" y="288"/>
+                  <a:pt x="6" y="288"/>
+                </a:cubicBezTo>
+                <a:cubicBezTo>
+                  <a:pt x="2" y="288"/>
+                  <a:pt x="0" y="285"/>
+                  <a:pt x="0" y="282"/>
+                </a:cubicBezTo>
+                <a:cubicBezTo>
+                  <a:pt x="0" y="281"/>
+                  <a:pt x="0" y="256"/>
+                  <a:pt x="12" y="231"/>
+                </a:cubicBezTo>
+                <a:cubicBezTo>
+                  <a:pt x="21" y="213"/>
+                  <a:pt x="51" y="202"/>
+                  <a:pt x="93" y="187"/>
+                </a:cubicBezTo>
+                <a:cubicBezTo>
+                  <a:pt x="98" y="185"/>
+                  <a:pt x="103" y="183"/>
+                  <a:pt x="108" y="181"/>
+                </a:cubicBezTo>
+                <a:cubicBezTo>
+                  <a:pt x="108" y="152"/>
+                  <a:pt x="108" y="152"/>
+                  <a:pt x="108" y="152"/>
+                </a:cubicBezTo>
+                <a:cubicBezTo>
+                  <a:pt x="102" y="148"/>
+                  <a:pt x="91" y="136"/>
+                  <a:pt x="90" y="117"/>
+                </a:cubicBezTo>
+                <a:cubicBezTo>
+                  <a:pt x="87" y="115"/>
+                  <a:pt x="85" y="111"/>
+                  <a:pt x="84" y="106"/>
+                </a:cubicBezTo>
+                <a:cubicBezTo>
+                  <a:pt x="82" y="97"/>
+                  <a:pt x="83" y="87"/>
+                  <a:pt x="89" y="81"/>
+                </a:cubicBezTo>
+                <a:cubicBezTo>
+                  <a:pt x="89" y="80"/>
+                  <a:pt x="88" y="80"/>
+                  <a:pt x="88" y="79"/>
+                </a:cubicBezTo>
+                <a:cubicBezTo>
+                  <a:pt x="84" y="65"/>
+                  <a:pt x="77" y="40"/>
+                  <a:pt x="87" y="26"/>
+                </a:cubicBezTo>
+                <a:cubicBezTo>
+                  <a:pt x="91" y="21"/>
+                  <a:pt x="96" y="18"/>
+                  <a:pt x="104" y="18"/>
+                </a:cubicBezTo>
+                <a:cubicBezTo>
+                  <a:pt x="111" y="4"/>
+                  <a:pt x="135" y="0"/>
+                  <a:pt x="155" y="0"/>
+                </a:cubicBezTo>
+                <a:cubicBezTo>
+                  <a:pt x="178" y="1"/>
+                  <a:pt x="206" y="8"/>
+                  <a:pt x="210" y="28"/>
+                </a:cubicBezTo>
+                <a:cubicBezTo>
+                  <a:pt x="213" y="45"/>
+                  <a:pt x="204" y="67"/>
+                  <a:pt x="200" y="78"/>
+                </a:cubicBezTo>
+                <a:cubicBezTo>
+                  <a:pt x="199" y="79"/>
+                  <a:pt x="199" y="80"/>
+                  <a:pt x="199" y="81"/>
+                </a:cubicBezTo>
+                <a:cubicBezTo>
+                  <a:pt x="205" y="87"/>
+                  <a:pt x="206" y="97"/>
+                  <a:pt x="204" y="106"/>
+                </a:cubicBezTo>
+                <a:cubicBezTo>
+                  <a:pt x="202" y="111"/>
+                  <a:pt x="200" y="115"/>
+                  <a:pt x="198" y="117"/>
+                </a:cubicBezTo>
+                <a:cubicBezTo>
+                  <a:pt x="196" y="136"/>
+                  <a:pt x="185" y="148"/>
+                  <a:pt x="180" y="152"/>
+                </a:cubicBezTo>
+                <a:cubicBezTo>
+                  <a:pt x="180" y="181"/>
+                  <a:pt x="180" y="181"/>
+                  <a:pt x="180" y="181"/>
+                </a:cubicBezTo>
+                <a:cubicBezTo>
+                  <a:pt x="185" y="183"/>
+                  <a:pt x="190" y="185"/>
+                  <a:pt x="194" y="187"/>
+                </a:cubicBezTo>
+                <a:cubicBezTo>
+                  <a:pt x="236" y="202"/>
+                  <a:pt x="266" y="213"/>
+                  <a:pt x="275" y="231"/>
+                </a:cubicBezTo>
+                <a:cubicBezTo>
+                  <a:pt x="287" y="256"/>
+                  <a:pt x="288" y="281"/>
+                  <a:pt x="288" y="282"/>
+                </a:cubicBezTo>
+                <a:cubicBezTo>
+                  <a:pt x="288" y="285"/>
+                  <a:pt x="285" y="288"/>
+                  <a:pt x="282" y="288"/>
+                </a:cubicBezTo>
+                <a:close/>
+                <a:moveTo>
+                  <a:pt x="12" y="276"/>
+                </a:moveTo>
+                <a:cubicBezTo>
+                  <a:pt x="275" y="276"/>
+                  <a:pt x="275" y="276"/>
+                  <a:pt x="275" y="276"/>
+                </a:cubicBezTo>
+                <a:cubicBezTo>
+                  <a:pt x="274" y="268"/>
+                  <a:pt x="272" y="252"/>
+                  <a:pt x="264" y="236"/>
+                </a:cubicBezTo>
+                <a:cubicBezTo>
+                  <a:pt x="258" y="223"/>
+                  <a:pt x="226" y="211"/>
+                  <a:pt x="190" y="198"/>
+                </a:cubicBezTo>
+                <a:cubicBezTo>
+                  <a:pt x="184" y="196"/>
+                  <a:pt x="178" y="193"/>
+                  <a:pt x="172" y="191"/>
+                </a:cubicBezTo>
+                <a:cubicBezTo>
+                  <a:pt x="169" y="190"/>
+                  <a:pt x="168" y="188"/>
+                  <a:pt x="168" y="185"/>
+                </a:cubicBezTo>
+                <a:cubicBezTo>
+                  <a:pt x="168" y="149"/>
+                  <a:pt x="168" y="149"/>
+                  <a:pt x="168" y="149"/>
+                </a:cubicBezTo>
+                <a:cubicBezTo>
+                  <a:pt x="168" y="147"/>
+                  <a:pt x="169" y="145"/>
+                  <a:pt x="170" y="144"/>
+                </a:cubicBezTo>
+                <a:cubicBezTo>
+                  <a:pt x="171" y="144"/>
+                  <a:pt x="186" y="134"/>
+                  <a:pt x="186" y="113"/>
+                </a:cubicBezTo>
+                <a:cubicBezTo>
+                  <a:pt x="186" y="111"/>
+                  <a:pt x="188" y="108"/>
+                  <a:pt x="190" y="108"/>
+                </a:cubicBezTo>
+                <a:cubicBezTo>
+                  <a:pt x="191" y="106"/>
+                  <a:pt x="193" y="100"/>
+                  <a:pt x="192" y="95"/>
+                </a:cubicBezTo>
+                <a:cubicBezTo>
+                  <a:pt x="192" y="92"/>
+                  <a:pt x="191" y="90"/>
+                  <a:pt x="189" y="89"/>
+                </a:cubicBezTo>
+                <a:cubicBezTo>
+                  <a:pt x="187" y="88"/>
+                  <a:pt x="186" y="86"/>
+                  <a:pt x="186" y="83"/>
+                </a:cubicBezTo>
+                <a:cubicBezTo>
+                  <a:pt x="186" y="81"/>
+                  <a:pt x="187" y="79"/>
+                  <a:pt x="189" y="74"/>
+                </a:cubicBezTo>
+                <a:cubicBezTo>
+                  <a:pt x="193" y="63"/>
+                  <a:pt x="200" y="44"/>
+                  <a:pt x="198" y="31"/>
+                </a:cubicBezTo>
+                <a:cubicBezTo>
+                  <a:pt x="196" y="20"/>
+                  <a:pt x="178" y="13"/>
+                  <a:pt x="154" y="12"/>
+                </a:cubicBezTo>
+                <a:cubicBezTo>
+                  <a:pt x="131" y="11"/>
+                  <a:pt x="115" y="18"/>
+                  <a:pt x="113" y="25"/>
+                </a:cubicBezTo>
+                <a:cubicBezTo>
+                  <a:pt x="113" y="27"/>
+                  <a:pt x="110" y="29"/>
+                  <a:pt x="108" y="29"/>
+                </a:cubicBezTo>
+                <a:cubicBezTo>
+                  <a:pt x="102" y="29"/>
+                  <a:pt x="99" y="31"/>
+                  <a:pt x="97" y="34"/>
+                </a:cubicBezTo>
+                <a:cubicBezTo>
+                  <a:pt x="90" y="43"/>
+                  <a:pt x="97" y="66"/>
+                  <a:pt x="100" y="75"/>
+                </a:cubicBezTo>
+                <a:cubicBezTo>
+                  <a:pt x="101" y="80"/>
+                  <a:pt x="102" y="82"/>
+                  <a:pt x="102" y="83"/>
+                </a:cubicBezTo>
+                <a:cubicBezTo>
+                  <a:pt x="102" y="86"/>
+                  <a:pt x="100" y="88"/>
+                  <a:pt x="98" y="89"/>
+                </a:cubicBezTo>
+                <a:cubicBezTo>
+                  <a:pt x="96" y="90"/>
+                  <a:pt x="95" y="92"/>
+                  <a:pt x="95" y="95"/>
+                </a:cubicBezTo>
+                <a:cubicBezTo>
+                  <a:pt x="94" y="100"/>
+                  <a:pt x="96" y="106"/>
+                  <a:pt x="97" y="108"/>
+                </a:cubicBezTo>
+                <a:cubicBezTo>
+                  <a:pt x="100" y="108"/>
+                  <a:pt x="102" y="111"/>
+                  <a:pt x="102" y="113"/>
+                </a:cubicBezTo>
+                <a:cubicBezTo>
+                  <a:pt x="102" y="134"/>
+                  <a:pt x="117" y="144"/>
+                  <a:pt x="117" y="144"/>
+                </a:cubicBezTo>
+                <a:cubicBezTo>
+                  <a:pt x="119" y="145"/>
+                  <a:pt x="120" y="147"/>
+                  <a:pt x="120" y="149"/>
+                </a:cubicBezTo>
+                <a:cubicBezTo>
+                  <a:pt x="120" y="185"/>
+                  <a:pt x="120" y="185"/>
+                  <a:pt x="120" y="185"/>
+                </a:cubicBezTo>
+                <a:cubicBezTo>
+                  <a:pt x="120" y="188"/>
+                  <a:pt x="118" y="190"/>
+                  <a:pt x="116" y="191"/>
+                </a:cubicBezTo>
+                <a:cubicBezTo>
+                  <a:pt x="109" y="193"/>
+                  <a:pt x="103" y="196"/>
+                  <a:pt x="97" y="198"/>
+                </a:cubicBezTo>
+                <a:cubicBezTo>
+                  <a:pt x="61" y="211"/>
+                  <a:pt x="30" y="223"/>
+                  <a:pt x="23" y="236"/>
+                </a:cubicBezTo>
+                <a:cubicBezTo>
+                  <a:pt x="15" y="252"/>
+                  <a:pt x="13" y="268"/>
+                  <a:pt x="12" y="276"/>
+                </a:cubicBezTo>
+                <a:close/>
+              </a:path>
+            </a:pathLst>
+          </a:custGeom>
+          <a:solidFill>
+            <a:schemeClr val="tx2"/>
+          </a:solidFill>
+          <a:ln>
+            <a:noFill/>
+          </a:ln>
+        </p:spPr>
+        <p:txBody>
+          <a:bodyPr vert="horz" wrap="square" lIns="91440" tIns="45720" rIns="91440" bIns="45720" numCol="1" anchor="t" anchorCtr="0" compatLnSpc="1">
+            <a:prstTxWarp prst="textNoShape">
+              <a:avLst/>
+            </a:prstTxWarp>
+          </a:bodyPr>
+          <a:lstStyle/>
+          <a:p>
+            <a:endParaRPr lang="en-US" dirty="0">
+              <a:latin typeface="+mn-lt"/>
+            </a:endParaRPr>
+          </a:p>
+        </p:txBody>
+      </p:sp>
+      <p:sp>
+        <p:nvSpPr>
+          <p:cNvPr id="9" name="Freeform 225">
+            <a:extLst>
+              <a:ext uri="{FF2B5EF4-FFF2-40B4-BE49-F238E27FC236}">
+                <a16:creationId xmlns:a16="http://schemas.microsoft.com/office/drawing/2014/main" id="{293F04C5-9AEE-4E3D-85ED-9786D2E4944A}"/>
+              </a:ext>
+            </a:extLst>
+          </p:cNvPr>
+          <p:cNvSpPr>
+            <a:spLocks noEditPoints="1"/>
+          </p:cNvSpPr>
+          <p:nvPr/>
+        </p:nvSpPr>
+        <p:spPr bwMode="auto">
+          <a:xfrm>
+            <a:off x="6797858" y="178542"/>
+            <a:ext cx="549124" cy="536674"/>
+          </a:xfrm>
+          <a:custGeom>
+            <a:avLst/>
+            <a:gdLst>
+              <a:gd name="T0" fmla="*/ 282 w 288"/>
+              <a:gd name="T1" fmla="*/ 288 h 288"/>
+              <a:gd name="T2" fmla="*/ 6 w 288"/>
+              <a:gd name="T3" fmla="*/ 288 h 288"/>
+              <a:gd name="T4" fmla="*/ 0 w 288"/>
+              <a:gd name="T5" fmla="*/ 282 h 288"/>
+              <a:gd name="T6" fmla="*/ 12 w 288"/>
+              <a:gd name="T7" fmla="*/ 231 h 288"/>
+              <a:gd name="T8" fmla="*/ 93 w 288"/>
+              <a:gd name="T9" fmla="*/ 187 h 288"/>
+              <a:gd name="T10" fmla="*/ 108 w 288"/>
+              <a:gd name="T11" fmla="*/ 181 h 288"/>
+              <a:gd name="T12" fmla="*/ 108 w 288"/>
+              <a:gd name="T13" fmla="*/ 152 h 288"/>
+              <a:gd name="T14" fmla="*/ 90 w 288"/>
+              <a:gd name="T15" fmla="*/ 117 h 288"/>
+              <a:gd name="T16" fmla="*/ 84 w 288"/>
+              <a:gd name="T17" fmla="*/ 106 h 288"/>
+              <a:gd name="T18" fmla="*/ 89 w 288"/>
+              <a:gd name="T19" fmla="*/ 81 h 288"/>
+              <a:gd name="T20" fmla="*/ 88 w 288"/>
+              <a:gd name="T21" fmla="*/ 79 h 288"/>
+              <a:gd name="T22" fmla="*/ 87 w 288"/>
+              <a:gd name="T23" fmla="*/ 26 h 288"/>
+              <a:gd name="T24" fmla="*/ 104 w 288"/>
+              <a:gd name="T25" fmla="*/ 18 h 288"/>
+              <a:gd name="T26" fmla="*/ 155 w 288"/>
+              <a:gd name="T27" fmla="*/ 0 h 288"/>
+              <a:gd name="T28" fmla="*/ 210 w 288"/>
+              <a:gd name="T29" fmla="*/ 28 h 288"/>
+              <a:gd name="T30" fmla="*/ 200 w 288"/>
+              <a:gd name="T31" fmla="*/ 78 h 288"/>
+              <a:gd name="T32" fmla="*/ 199 w 288"/>
+              <a:gd name="T33" fmla="*/ 81 h 288"/>
+              <a:gd name="T34" fmla="*/ 204 w 288"/>
+              <a:gd name="T35" fmla="*/ 106 h 288"/>
+              <a:gd name="T36" fmla="*/ 198 w 288"/>
+              <a:gd name="T37" fmla="*/ 117 h 288"/>
+              <a:gd name="T38" fmla="*/ 180 w 288"/>
+              <a:gd name="T39" fmla="*/ 152 h 288"/>
+              <a:gd name="T40" fmla="*/ 180 w 288"/>
+              <a:gd name="T41" fmla="*/ 181 h 288"/>
+              <a:gd name="T42" fmla="*/ 194 w 288"/>
+              <a:gd name="T43" fmla="*/ 187 h 288"/>
+              <a:gd name="T44" fmla="*/ 275 w 288"/>
+              <a:gd name="T45" fmla="*/ 231 h 288"/>
+              <a:gd name="T46" fmla="*/ 288 w 288"/>
+              <a:gd name="T47" fmla="*/ 282 h 288"/>
+              <a:gd name="T48" fmla="*/ 282 w 288"/>
+              <a:gd name="T49" fmla="*/ 288 h 288"/>
+              <a:gd name="T50" fmla="*/ 12 w 288"/>
+              <a:gd name="T51" fmla="*/ 276 h 288"/>
+              <a:gd name="T52" fmla="*/ 275 w 288"/>
+              <a:gd name="T53" fmla="*/ 276 h 288"/>
+              <a:gd name="T54" fmla="*/ 264 w 288"/>
+              <a:gd name="T55" fmla="*/ 236 h 288"/>
+              <a:gd name="T56" fmla="*/ 190 w 288"/>
+              <a:gd name="T57" fmla="*/ 198 h 288"/>
+              <a:gd name="T58" fmla="*/ 172 w 288"/>
+              <a:gd name="T59" fmla="*/ 191 h 288"/>
+              <a:gd name="T60" fmla="*/ 168 w 288"/>
+              <a:gd name="T61" fmla="*/ 185 h 288"/>
+              <a:gd name="T62" fmla="*/ 168 w 288"/>
+              <a:gd name="T63" fmla="*/ 149 h 288"/>
+              <a:gd name="T64" fmla="*/ 170 w 288"/>
+              <a:gd name="T65" fmla="*/ 144 h 288"/>
+              <a:gd name="T66" fmla="*/ 186 w 288"/>
+              <a:gd name="T67" fmla="*/ 113 h 288"/>
+              <a:gd name="T68" fmla="*/ 190 w 288"/>
+              <a:gd name="T69" fmla="*/ 108 h 288"/>
+              <a:gd name="T70" fmla="*/ 192 w 288"/>
+              <a:gd name="T71" fmla="*/ 95 h 288"/>
+              <a:gd name="T72" fmla="*/ 189 w 288"/>
+              <a:gd name="T73" fmla="*/ 89 h 288"/>
+              <a:gd name="T74" fmla="*/ 186 w 288"/>
+              <a:gd name="T75" fmla="*/ 83 h 288"/>
+              <a:gd name="T76" fmla="*/ 189 w 288"/>
+              <a:gd name="T77" fmla="*/ 74 h 288"/>
+              <a:gd name="T78" fmla="*/ 198 w 288"/>
+              <a:gd name="T79" fmla="*/ 31 h 288"/>
+              <a:gd name="T80" fmla="*/ 154 w 288"/>
+              <a:gd name="T81" fmla="*/ 12 h 288"/>
+              <a:gd name="T82" fmla="*/ 113 w 288"/>
+              <a:gd name="T83" fmla="*/ 25 h 288"/>
+              <a:gd name="T84" fmla="*/ 108 w 288"/>
+              <a:gd name="T85" fmla="*/ 29 h 288"/>
+              <a:gd name="T86" fmla="*/ 97 w 288"/>
+              <a:gd name="T87" fmla="*/ 34 h 288"/>
+              <a:gd name="T88" fmla="*/ 100 w 288"/>
+              <a:gd name="T89" fmla="*/ 75 h 288"/>
+              <a:gd name="T90" fmla="*/ 102 w 288"/>
+              <a:gd name="T91" fmla="*/ 83 h 288"/>
+              <a:gd name="T92" fmla="*/ 98 w 288"/>
+              <a:gd name="T93" fmla="*/ 89 h 288"/>
+              <a:gd name="T94" fmla="*/ 95 w 288"/>
+              <a:gd name="T95" fmla="*/ 95 h 288"/>
+              <a:gd name="T96" fmla="*/ 97 w 288"/>
+              <a:gd name="T97" fmla="*/ 108 h 288"/>
+              <a:gd name="T98" fmla="*/ 102 w 288"/>
+              <a:gd name="T99" fmla="*/ 113 h 288"/>
+              <a:gd name="T100" fmla="*/ 117 w 288"/>
+              <a:gd name="T101" fmla="*/ 144 h 288"/>
+              <a:gd name="T102" fmla="*/ 120 w 288"/>
+              <a:gd name="T103" fmla="*/ 149 h 288"/>
+              <a:gd name="T104" fmla="*/ 120 w 288"/>
+              <a:gd name="T105" fmla="*/ 185 h 288"/>
+              <a:gd name="T106" fmla="*/ 116 w 288"/>
+              <a:gd name="T107" fmla="*/ 191 h 288"/>
+              <a:gd name="T108" fmla="*/ 97 w 288"/>
+              <a:gd name="T109" fmla="*/ 198 h 288"/>
+              <a:gd name="T110" fmla="*/ 23 w 288"/>
+              <a:gd name="T111" fmla="*/ 236 h 288"/>
+              <a:gd name="T112" fmla="*/ 12 w 288"/>
+              <a:gd name="T113" fmla="*/ 276 h 288"/>
+            </a:gdLst>
+            <a:ahLst/>
+            <a:cxnLst>
+              <a:cxn ang="0">
+                <a:pos x="T0" y="T1"/>
+              </a:cxn>
+              <a:cxn ang="0">
+                <a:pos x="T2" y="T3"/>
+              </a:cxn>
+              <a:cxn ang="0">
+                <a:pos x="T4" y="T5"/>
+              </a:cxn>
+              <a:cxn ang="0">
+                <a:pos x="T6" y="T7"/>
+              </a:cxn>
+              <a:cxn ang="0">
+                <a:pos x="T8" y="T9"/>
+              </a:cxn>
+              <a:cxn ang="0">
+                <a:pos x="T10" y="T11"/>
+              </a:cxn>
+              <a:cxn ang="0">
+                <a:pos x="T12" y="T13"/>
+              </a:cxn>
+              <a:cxn ang="0">
+                <a:pos x="T14" y="T15"/>
+              </a:cxn>
+              <a:cxn ang="0">
+                <a:pos x="T16" y="T17"/>
+              </a:cxn>
+              <a:cxn ang="0">
+                <a:pos x="T18" y="T19"/>
+              </a:cxn>
+              <a:cxn ang="0">
+                <a:pos x="T20" y="T21"/>
+              </a:cxn>
+              <a:cxn ang="0">
+                <a:pos x="T22" y="T23"/>
+              </a:cxn>
+              <a:cxn ang="0">
+                <a:pos x="T24" y="T25"/>
+              </a:cxn>
+              <a:cxn ang="0">
+                <a:pos x="T26" y="T27"/>
+              </a:cxn>
+              <a:cxn ang="0">
+                <a:pos x="T28" y="T29"/>
+              </a:cxn>
+              <a:cxn ang="0">
+                <a:pos x="T30" y="T31"/>
+              </a:cxn>
+              <a:cxn ang="0">
+                <a:pos x="T32" y="T33"/>
+              </a:cxn>
+              <a:cxn ang="0">
+                <a:pos x="T34" y="T35"/>
+              </a:cxn>
+              <a:cxn ang="0">
+                <a:pos x="T36" y="T37"/>
+              </a:cxn>
+              <a:cxn ang="0">
+                <a:pos x="T38" y="T39"/>
+              </a:cxn>
+              <a:cxn ang="0">
+                <a:pos x="T40" y="T41"/>
+              </a:cxn>
+              <a:cxn ang="0">
+                <a:pos x="T42" y="T43"/>
+              </a:cxn>
+              <a:cxn ang="0">
+                <a:pos x="T44" y="T45"/>
+              </a:cxn>
+              <a:cxn ang="0">
+                <a:pos x="T46" y="T47"/>
+              </a:cxn>
+              <a:cxn ang="0">
+                <a:pos x="T48" y="T49"/>
+              </a:cxn>
+              <a:cxn ang="0">
+                <a:pos x="T50" y="T51"/>
+              </a:cxn>
+              <a:cxn ang="0">
+                <a:pos x="T52" y="T53"/>
+              </a:cxn>
+              <a:cxn ang="0">
+                <a:pos x="T54" y="T55"/>
+              </a:cxn>
+              <a:cxn ang="0">
+                <a:pos x="T56" y="T57"/>
+              </a:cxn>
+              <a:cxn ang="0">
+                <a:pos x="T58" y="T59"/>
+              </a:cxn>
+              <a:cxn ang="0">
+                <a:pos x="T60" y="T61"/>
+              </a:cxn>
+              <a:cxn ang="0">
+                <a:pos x="T62" y="T63"/>
+              </a:cxn>
+              <a:cxn ang="0">
+                <a:pos x="T64" y="T65"/>
+              </a:cxn>
+              <a:cxn ang="0">
+                <a:pos x="T66" y="T67"/>
+              </a:cxn>
+              <a:cxn ang="0">
+                <a:pos x="T68" y="T69"/>
+              </a:cxn>
+              <a:cxn ang="0">
+                <a:pos x="T70" y="T71"/>
+              </a:cxn>
+              <a:cxn ang="0">
+                <a:pos x="T72" y="T73"/>
+              </a:cxn>
+              <a:cxn ang="0">
+                <a:pos x="T74" y="T75"/>
+              </a:cxn>
+              <a:cxn ang="0">
+                <a:pos x="T76" y="T77"/>
+              </a:cxn>
+              <a:cxn ang="0">
+                <a:pos x="T78" y="T79"/>
+              </a:cxn>
+              <a:cxn ang="0">
+                <a:pos x="T80" y="T81"/>
+              </a:cxn>
+              <a:cxn ang="0">
+                <a:pos x="T82" y="T83"/>
+              </a:cxn>
+              <a:cxn ang="0">
+                <a:pos x="T84" y="T85"/>
+              </a:cxn>
+              <a:cxn ang="0">
+                <a:pos x="T86" y="T87"/>
+              </a:cxn>
+              <a:cxn ang="0">
+                <a:pos x="T88" y="T89"/>
+              </a:cxn>
+              <a:cxn ang="0">
+                <a:pos x="T90" y="T91"/>
+              </a:cxn>
+              <a:cxn ang="0">
+                <a:pos x="T92" y="T93"/>
+              </a:cxn>
+              <a:cxn ang="0">
+                <a:pos x="T94" y="T95"/>
+              </a:cxn>
+              <a:cxn ang="0">
+                <a:pos x="T96" y="T97"/>
+              </a:cxn>
+              <a:cxn ang="0">
+                <a:pos x="T98" y="T99"/>
+              </a:cxn>
+              <a:cxn ang="0">
+                <a:pos x="T100" y="T101"/>
+              </a:cxn>
+              <a:cxn ang="0">
+                <a:pos x="T102" y="T103"/>
+              </a:cxn>
+              <a:cxn ang="0">
+                <a:pos x="T104" y="T105"/>
+              </a:cxn>
+              <a:cxn ang="0">
+                <a:pos x="T106" y="T107"/>
+              </a:cxn>
+              <a:cxn ang="0">
+                <a:pos x="T108" y="T109"/>
+              </a:cxn>
+              <a:cxn ang="0">
+                <a:pos x="T110" y="T111"/>
+              </a:cxn>
+              <a:cxn ang="0">
+                <a:pos x="T112" y="T113"/>
+              </a:cxn>
+            </a:cxnLst>
+            <a:rect l="0" t="0" r="r" b="b"/>
+            <a:pathLst>
+              <a:path w="288" h="288">
+                <a:moveTo>
+                  <a:pt x="282" y="288"/>
+                </a:moveTo>
+                <a:cubicBezTo>
+                  <a:pt x="6" y="288"/>
+                  <a:pt x="6" y="288"/>
+                  <a:pt x="6" y="288"/>
+                </a:cubicBezTo>
+                <a:cubicBezTo>
+                  <a:pt x="2" y="288"/>
+                  <a:pt x="0" y="285"/>
+                  <a:pt x="0" y="282"/>
+                </a:cubicBezTo>
+                <a:cubicBezTo>
+                  <a:pt x="0" y="281"/>
+                  <a:pt x="0" y="256"/>
+                  <a:pt x="12" y="231"/>
+                </a:cubicBezTo>
+                <a:cubicBezTo>
+                  <a:pt x="21" y="213"/>
+                  <a:pt x="51" y="202"/>
+                  <a:pt x="93" y="187"/>
+                </a:cubicBezTo>
+                <a:cubicBezTo>
+                  <a:pt x="98" y="185"/>
+                  <a:pt x="103" y="183"/>
+                  <a:pt x="108" y="181"/>
+                </a:cubicBezTo>
+                <a:cubicBezTo>
+                  <a:pt x="108" y="152"/>
+                  <a:pt x="108" y="152"/>
+                  <a:pt x="108" y="152"/>
+                </a:cubicBezTo>
+                <a:cubicBezTo>
+                  <a:pt x="102" y="148"/>
+                  <a:pt x="91" y="136"/>
+                  <a:pt x="90" y="117"/>
+                </a:cubicBezTo>
+                <a:cubicBezTo>
+                  <a:pt x="87" y="115"/>
+                  <a:pt x="85" y="111"/>
+                  <a:pt x="84" y="106"/>
+                </a:cubicBezTo>
+                <a:cubicBezTo>
+                  <a:pt x="82" y="97"/>
+                  <a:pt x="83" y="87"/>
+                  <a:pt x="89" y="81"/>
+                </a:cubicBezTo>
+                <a:cubicBezTo>
+                  <a:pt x="89" y="80"/>
+                  <a:pt x="88" y="80"/>
+                  <a:pt x="88" y="79"/>
+                </a:cubicBezTo>
+                <a:cubicBezTo>
+                  <a:pt x="84" y="65"/>
+                  <a:pt x="77" y="40"/>
+                  <a:pt x="87" y="26"/>
+                </a:cubicBezTo>
+                <a:cubicBezTo>
+                  <a:pt x="91" y="21"/>
+                  <a:pt x="96" y="18"/>
+                  <a:pt x="104" y="18"/>
+                </a:cubicBezTo>
+                <a:cubicBezTo>
+                  <a:pt x="111" y="4"/>
+                  <a:pt x="135" y="0"/>
+                  <a:pt x="155" y="0"/>
+                </a:cubicBezTo>
+                <a:cubicBezTo>
+                  <a:pt x="178" y="1"/>
+                  <a:pt x="206" y="8"/>
+                  <a:pt x="210" y="28"/>
+                </a:cubicBezTo>
+                <a:cubicBezTo>
+                  <a:pt x="213" y="45"/>
+                  <a:pt x="204" y="67"/>
+                  <a:pt x="200" y="78"/>
+                </a:cubicBezTo>
+                <a:cubicBezTo>
+                  <a:pt x="199" y="79"/>
+                  <a:pt x="199" y="80"/>
+                  <a:pt x="199" y="81"/>
+                </a:cubicBezTo>
+                <a:cubicBezTo>
+                  <a:pt x="205" y="87"/>
+                  <a:pt x="206" y="97"/>
+                  <a:pt x="204" y="106"/>
+                </a:cubicBezTo>
+                <a:cubicBezTo>
+                  <a:pt x="202" y="111"/>
+                  <a:pt x="200" y="115"/>
+                  <a:pt x="198" y="117"/>
+                </a:cubicBezTo>
+                <a:cubicBezTo>
+                  <a:pt x="196" y="136"/>
+                  <a:pt x="185" y="148"/>
+                  <a:pt x="180" y="152"/>
+                </a:cubicBezTo>
+                <a:cubicBezTo>
+                  <a:pt x="180" y="181"/>
+                  <a:pt x="180" y="181"/>
+                  <a:pt x="180" y="181"/>
+                </a:cubicBezTo>
+                <a:cubicBezTo>
+                  <a:pt x="185" y="183"/>
+                  <a:pt x="190" y="185"/>
+                  <a:pt x="194" y="187"/>
+                </a:cubicBezTo>
+                <a:cubicBezTo>
+                  <a:pt x="236" y="202"/>
+                  <a:pt x="266" y="213"/>
+                  <a:pt x="275" y="231"/>
+                </a:cubicBezTo>
+                <a:cubicBezTo>
+                  <a:pt x="287" y="256"/>
+                  <a:pt x="288" y="281"/>
+                  <a:pt x="288" y="282"/>
+                </a:cubicBezTo>
+                <a:cubicBezTo>
+                  <a:pt x="288" y="285"/>
+                  <a:pt x="285" y="288"/>
+                  <a:pt x="282" y="288"/>
+                </a:cubicBezTo>
+                <a:close/>
+                <a:moveTo>
+                  <a:pt x="12" y="276"/>
+                </a:moveTo>
+                <a:cubicBezTo>
+                  <a:pt x="275" y="276"/>
+                  <a:pt x="275" y="276"/>
+                  <a:pt x="275" y="276"/>
+                </a:cubicBezTo>
+                <a:cubicBezTo>
+                  <a:pt x="274" y="268"/>
+                  <a:pt x="272" y="252"/>
+                  <a:pt x="264" y="236"/>
+                </a:cubicBezTo>
+                <a:cubicBezTo>
+                  <a:pt x="258" y="223"/>
+                  <a:pt x="226" y="211"/>
+                  <a:pt x="190" y="198"/>
+                </a:cubicBezTo>
+                <a:cubicBezTo>
+                  <a:pt x="184" y="196"/>
+                  <a:pt x="178" y="193"/>
+                  <a:pt x="172" y="191"/>
+                </a:cubicBezTo>
+                <a:cubicBezTo>
+                  <a:pt x="169" y="190"/>
+                  <a:pt x="168" y="188"/>
+                  <a:pt x="168" y="185"/>
+                </a:cubicBezTo>
+                <a:cubicBezTo>
+                  <a:pt x="168" y="149"/>
+                  <a:pt x="168" y="149"/>
+                  <a:pt x="168" y="149"/>
+                </a:cubicBezTo>
+                <a:cubicBezTo>
+                  <a:pt x="168" y="147"/>
+                  <a:pt x="169" y="145"/>
+                  <a:pt x="170" y="144"/>
+                </a:cubicBezTo>
+                <a:cubicBezTo>
+                  <a:pt x="171" y="144"/>
+                  <a:pt x="186" y="134"/>
+                  <a:pt x="186" y="113"/>
+                </a:cubicBezTo>
+                <a:cubicBezTo>
+                  <a:pt x="186" y="111"/>
+                  <a:pt x="188" y="108"/>
+                  <a:pt x="190" y="108"/>
+                </a:cubicBezTo>
+                <a:cubicBezTo>
+                  <a:pt x="191" y="106"/>
+                  <a:pt x="193" y="100"/>
+                  <a:pt x="192" y="95"/>
+                </a:cubicBezTo>
+                <a:cubicBezTo>
+                  <a:pt x="192" y="92"/>
+                  <a:pt x="191" y="90"/>
+                  <a:pt x="189" y="89"/>
+                </a:cubicBezTo>
+                <a:cubicBezTo>
+                  <a:pt x="187" y="88"/>
+                  <a:pt x="186" y="86"/>
+                  <a:pt x="186" y="83"/>
+                </a:cubicBezTo>
+                <a:cubicBezTo>
+                  <a:pt x="186" y="81"/>
+                  <a:pt x="187" y="79"/>
+                  <a:pt x="189" y="74"/>
+                </a:cubicBezTo>
+                <a:cubicBezTo>
+                  <a:pt x="193" y="63"/>
+                  <a:pt x="200" y="44"/>
+                  <a:pt x="198" y="31"/>
+                </a:cubicBezTo>
+                <a:cubicBezTo>
+                  <a:pt x="196" y="20"/>
+                  <a:pt x="178" y="13"/>
+                  <a:pt x="154" y="12"/>
+                </a:cubicBezTo>
+                <a:cubicBezTo>
+                  <a:pt x="131" y="11"/>
+                  <a:pt x="115" y="18"/>
+                  <a:pt x="113" y="25"/>
+                </a:cubicBezTo>
+                <a:cubicBezTo>
+                  <a:pt x="113" y="27"/>
+                  <a:pt x="110" y="29"/>
+                  <a:pt x="108" y="29"/>
+                </a:cubicBezTo>
+                <a:cubicBezTo>
+                  <a:pt x="102" y="29"/>
+                  <a:pt x="99" y="31"/>
+                  <a:pt x="97" y="34"/>
+                </a:cubicBezTo>
+                <a:cubicBezTo>
+                  <a:pt x="90" y="43"/>
+                  <a:pt x="97" y="66"/>
+                  <a:pt x="100" y="75"/>
+                </a:cubicBezTo>
+                <a:cubicBezTo>
+                  <a:pt x="101" y="80"/>
+                  <a:pt x="102" y="82"/>
+                  <a:pt x="102" y="83"/>
+                </a:cubicBezTo>
+                <a:cubicBezTo>
+                  <a:pt x="102" y="86"/>
+                  <a:pt x="100" y="88"/>
+                  <a:pt x="98" y="89"/>
+                </a:cubicBezTo>
+                <a:cubicBezTo>
+                  <a:pt x="96" y="90"/>
+                  <a:pt x="95" y="92"/>
+                  <a:pt x="95" y="95"/>
+                </a:cubicBezTo>
+                <a:cubicBezTo>
+                  <a:pt x="94" y="100"/>
+                  <a:pt x="96" y="106"/>
+                  <a:pt x="97" y="108"/>
+                </a:cubicBezTo>
+                <a:cubicBezTo>
+                  <a:pt x="100" y="108"/>
+                  <a:pt x="102" y="111"/>
+                  <a:pt x="102" y="113"/>
+                </a:cubicBezTo>
+                <a:cubicBezTo>
+                  <a:pt x="102" y="134"/>
+                  <a:pt x="117" y="144"/>
+                  <a:pt x="117" y="144"/>
+                </a:cubicBezTo>
+                <a:cubicBezTo>
+                  <a:pt x="119" y="145"/>
+                  <a:pt x="120" y="147"/>
+                  <a:pt x="120" y="149"/>
+                </a:cubicBezTo>
+                <a:cubicBezTo>
+                  <a:pt x="120" y="185"/>
+                  <a:pt x="120" y="185"/>
+                  <a:pt x="120" y="185"/>
+                </a:cubicBezTo>
+                <a:cubicBezTo>
+                  <a:pt x="120" y="188"/>
+                  <a:pt x="118" y="190"/>
+                  <a:pt x="116" y="191"/>
+                </a:cubicBezTo>
+                <a:cubicBezTo>
+                  <a:pt x="109" y="193"/>
+                  <a:pt x="103" y="196"/>
+                  <a:pt x="97" y="198"/>
+                </a:cubicBezTo>
+                <a:cubicBezTo>
+                  <a:pt x="61" y="211"/>
+                  <a:pt x="30" y="223"/>
+                  <a:pt x="23" y="236"/>
+                </a:cubicBezTo>
+                <a:cubicBezTo>
+                  <a:pt x="15" y="252"/>
+                  <a:pt x="13" y="268"/>
+                  <a:pt x="12" y="276"/>
+                </a:cubicBezTo>
+                <a:close/>
+              </a:path>
+            </a:pathLst>
+          </a:custGeom>
+          <a:solidFill>
+            <a:schemeClr val="tx2"/>
+          </a:solidFill>
+          <a:ln>
+            <a:noFill/>
+          </a:ln>
+        </p:spPr>
+        <p:txBody>
+          <a:bodyPr vert="horz" wrap="square" lIns="91440" tIns="45720" rIns="91440" bIns="45720" numCol="1" anchor="t" anchorCtr="0" compatLnSpc="1">
+            <a:prstTxWarp prst="textNoShape">
+              <a:avLst/>
+            </a:prstTxWarp>
+          </a:bodyPr>
+          <a:lstStyle/>
+          <a:p>
+            <a:endParaRPr lang="en-US" dirty="0">
+              <a:latin typeface="+mn-lt"/>
+            </a:endParaRPr>
+          </a:p>
+        </p:txBody>
+      </p:sp>
+      <p:sp>
+        <p:nvSpPr>
+          <p:cNvPr id="11" name="Freeform 225">
+            <a:extLst>
+              <a:ext uri="{FF2B5EF4-FFF2-40B4-BE49-F238E27FC236}">
+                <a16:creationId xmlns:a16="http://schemas.microsoft.com/office/drawing/2014/main" id="{0972A19F-40E4-4765-AEA4-E5ED2051D842}"/>
+              </a:ext>
+            </a:extLst>
+          </p:cNvPr>
+          <p:cNvSpPr>
+            <a:spLocks noEditPoints="1"/>
+          </p:cNvSpPr>
+          <p:nvPr/>
+        </p:nvSpPr>
+        <p:spPr bwMode="auto">
+          <a:xfrm>
+            <a:off x="9725469" y="170865"/>
+            <a:ext cx="549124" cy="536674"/>
+          </a:xfrm>
+          <a:custGeom>
+            <a:avLst/>
+            <a:gdLst>
+              <a:gd name="T0" fmla="*/ 282 w 288"/>
+              <a:gd name="T1" fmla="*/ 288 h 288"/>
+              <a:gd name="T2" fmla="*/ 6 w 288"/>
+              <a:gd name="T3" fmla="*/ 288 h 288"/>
+              <a:gd name="T4" fmla="*/ 0 w 288"/>
+              <a:gd name="T5" fmla="*/ 282 h 288"/>
+              <a:gd name="T6" fmla="*/ 12 w 288"/>
+              <a:gd name="T7" fmla="*/ 231 h 288"/>
+              <a:gd name="T8" fmla="*/ 93 w 288"/>
+              <a:gd name="T9" fmla="*/ 187 h 288"/>
+              <a:gd name="T10" fmla="*/ 108 w 288"/>
+              <a:gd name="T11" fmla="*/ 181 h 288"/>
+              <a:gd name="T12" fmla="*/ 108 w 288"/>
+              <a:gd name="T13" fmla="*/ 152 h 288"/>
+              <a:gd name="T14" fmla="*/ 90 w 288"/>
+              <a:gd name="T15" fmla="*/ 117 h 288"/>
+              <a:gd name="T16" fmla="*/ 84 w 288"/>
+              <a:gd name="T17" fmla="*/ 106 h 288"/>
+              <a:gd name="T18" fmla="*/ 89 w 288"/>
+              <a:gd name="T19" fmla="*/ 81 h 288"/>
+              <a:gd name="T20" fmla="*/ 88 w 288"/>
+              <a:gd name="T21" fmla="*/ 79 h 288"/>
+              <a:gd name="T22" fmla="*/ 87 w 288"/>
+              <a:gd name="T23" fmla="*/ 26 h 288"/>
+              <a:gd name="T24" fmla="*/ 104 w 288"/>
+              <a:gd name="T25" fmla="*/ 18 h 288"/>
+              <a:gd name="T26" fmla="*/ 155 w 288"/>
+              <a:gd name="T27" fmla="*/ 0 h 288"/>
+              <a:gd name="T28" fmla="*/ 210 w 288"/>
+              <a:gd name="T29" fmla="*/ 28 h 288"/>
+              <a:gd name="T30" fmla="*/ 200 w 288"/>
+              <a:gd name="T31" fmla="*/ 78 h 288"/>
+              <a:gd name="T32" fmla="*/ 199 w 288"/>
+              <a:gd name="T33" fmla="*/ 81 h 288"/>
+              <a:gd name="T34" fmla="*/ 204 w 288"/>
+              <a:gd name="T35" fmla="*/ 106 h 288"/>
+              <a:gd name="T36" fmla="*/ 198 w 288"/>
+              <a:gd name="T37" fmla="*/ 117 h 288"/>
+              <a:gd name="T38" fmla="*/ 180 w 288"/>
+              <a:gd name="T39" fmla="*/ 152 h 288"/>
+              <a:gd name="T40" fmla="*/ 180 w 288"/>
+              <a:gd name="T41" fmla="*/ 181 h 288"/>
+              <a:gd name="T42" fmla="*/ 194 w 288"/>
+              <a:gd name="T43" fmla="*/ 187 h 288"/>
+              <a:gd name="T44" fmla="*/ 275 w 288"/>
+              <a:gd name="T45" fmla="*/ 231 h 288"/>
+              <a:gd name="T46" fmla="*/ 288 w 288"/>
+              <a:gd name="T47" fmla="*/ 282 h 288"/>
+              <a:gd name="T48" fmla="*/ 282 w 288"/>
+              <a:gd name="T49" fmla="*/ 288 h 288"/>
+              <a:gd name="T50" fmla="*/ 12 w 288"/>
+              <a:gd name="T51" fmla="*/ 276 h 288"/>
+              <a:gd name="T52" fmla="*/ 275 w 288"/>
+              <a:gd name="T53" fmla="*/ 276 h 288"/>
+              <a:gd name="T54" fmla="*/ 264 w 288"/>
+              <a:gd name="T55" fmla="*/ 236 h 288"/>
+              <a:gd name="T56" fmla="*/ 190 w 288"/>
+              <a:gd name="T57" fmla="*/ 198 h 288"/>
+              <a:gd name="T58" fmla="*/ 172 w 288"/>
+              <a:gd name="T59" fmla="*/ 191 h 288"/>
+              <a:gd name="T60" fmla="*/ 168 w 288"/>
+              <a:gd name="T61" fmla="*/ 185 h 288"/>
+              <a:gd name="T62" fmla="*/ 168 w 288"/>
+              <a:gd name="T63" fmla="*/ 149 h 288"/>
+              <a:gd name="T64" fmla="*/ 170 w 288"/>
+              <a:gd name="T65" fmla="*/ 144 h 288"/>
+              <a:gd name="T66" fmla="*/ 186 w 288"/>
+              <a:gd name="T67" fmla="*/ 113 h 288"/>
+              <a:gd name="T68" fmla="*/ 190 w 288"/>
+              <a:gd name="T69" fmla="*/ 108 h 288"/>
+              <a:gd name="T70" fmla="*/ 192 w 288"/>
+              <a:gd name="T71" fmla="*/ 95 h 288"/>
+              <a:gd name="T72" fmla="*/ 189 w 288"/>
+              <a:gd name="T73" fmla="*/ 89 h 288"/>
+              <a:gd name="T74" fmla="*/ 186 w 288"/>
+              <a:gd name="T75" fmla="*/ 83 h 288"/>
+              <a:gd name="T76" fmla="*/ 189 w 288"/>
+              <a:gd name="T77" fmla="*/ 74 h 288"/>
+              <a:gd name="T78" fmla="*/ 198 w 288"/>
+              <a:gd name="T79" fmla="*/ 31 h 288"/>
+              <a:gd name="T80" fmla="*/ 154 w 288"/>
+              <a:gd name="T81" fmla="*/ 12 h 288"/>
+              <a:gd name="T82" fmla="*/ 113 w 288"/>
+              <a:gd name="T83" fmla="*/ 25 h 288"/>
+              <a:gd name="T84" fmla="*/ 108 w 288"/>
+              <a:gd name="T85" fmla="*/ 29 h 288"/>
+              <a:gd name="T86" fmla="*/ 97 w 288"/>
+              <a:gd name="T87" fmla="*/ 34 h 288"/>
+              <a:gd name="T88" fmla="*/ 100 w 288"/>
+              <a:gd name="T89" fmla="*/ 75 h 288"/>
+              <a:gd name="T90" fmla="*/ 102 w 288"/>
+              <a:gd name="T91" fmla="*/ 83 h 288"/>
+              <a:gd name="T92" fmla="*/ 98 w 288"/>
+              <a:gd name="T93" fmla="*/ 89 h 288"/>
+              <a:gd name="T94" fmla="*/ 95 w 288"/>
+              <a:gd name="T95" fmla="*/ 95 h 288"/>
+              <a:gd name="T96" fmla="*/ 97 w 288"/>
+              <a:gd name="T97" fmla="*/ 108 h 288"/>
+              <a:gd name="T98" fmla="*/ 102 w 288"/>
+              <a:gd name="T99" fmla="*/ 113 h 288"/>
+              <a:gd name="T100" fmla="*/ 117 w 288"/>
+              <a:gd name="T101" fmla="*/ 144 h 288"/>
+              <a:gd name="T102" fmla="*/ 120 w 288"/>
+              <a:gd name="T103" fmla="*/ 149 h 288"/>
+              <a:gd name="T104" fmla="*/ 120 w 288"/>
+              <a:gd name="T105" fmla="*/ 185 h 288"/>
+              <a:gd name="T106" fmla="*/ 116 w 288"/>
+              <a:gd name="T107" fmla="*/ 191 h 288"/>
+              <a:gd name="T108" fmla="*/ 97 w 288"/>
+              <a:gd name="T109" fmla="*/ 198 h 288"/>
+              <a:gd name="T110" fmla="*/ 23 w 288"/>
+              <a:gd name="T111" fmla="*/ 236 h 288"/>
+              <a:gd name="T112" fmla="*/ 12 w 288"/>
+              <a:gd name="T113" fmla="*/ 276 h 288"/>
+            </a:gdLst>
+            <a:ahLst/>
+            <a:cxnLst>
+              <a:cxn ang="0">
+                <a:pos x="T0" y="T1"/>
+              </a:cxn>
+              <a:cxn ang="0">
+                <a:pos x="T2" y="T3"/>
+              </a:cxn>
+              <a:cxn ang="0">
+                <a:pos x="T4" y="T5"/>
+              </a:cxn>
+              <a:cxn ang="0">
+                <a:pos x="T6" y="T7"/>
+              </a:cxn>
+              <a:cxn ang="0">
+                <a:pos x="T8" y="T9"/>
+              </a:cxn>
+              <a:cxn ang="0">
+                <a:pos x="T10" y="T11"/>
+              </a:cxn>
+              <a:cxn ang="0">
+                <a:pos x="T12" y="T13"/>
+              </a:cxn>
+              <a:cxn ang="0">
+                <a:pos x="T14" y="T15"/>
+              </a:cxn>
+              <a:cxn ang="0">
+                <a:pos x="T16" y="T17"/>
+              </a:cxn>
+              <a:cxn ang="0">
+                <a:pos x="T18" y="T19"/>
+              </a:cxn>
+              <a:cxn ang="0">
+                <a:pos x="T20" y="T21"/>
+              </a:cxn>
+              <a:cxn ang="0">
+                <a:pos x="T22" y="T23"/>
+              </a:cxn>
+              <a:cxn ang="0">
+                <a:pos x="T24" y="T25"/>
+              </a:cxn>
+              <a:cxn ang="0">
+                <a:pos x="T26" y="T27"/>
+              </a:cxn>
+              <a:cxn ang="0">
+                <a:pos x="T28" y="T29"/>
+              </a:cxn>
+              <a:cxn ang="0">
+                <a:pos x="T30" y="T31"/>
+              </a:cxn>
+              <a:cxn ang="0">
+                <a:pos x="T32" y="T33"/>
+              </a:cxn>
+              <a:cxn ang="0">
+                <a:pos x="T34" y="T35"/>
+              </a:cxn>
+              <a:cxn ang="0">
+                <a:pos x="T36" y="T37"/>
+              </a:cxn>
+              <a:cxn ang="0">
+                <a:pos x="T38" y="T39"/>
+              </a:cxn>
+              <a:cxn ang="0">
+                <a:pos x="T40" y="T41"/>
+              </a:cxn>
+              <a:cxn ang="0">
+                <a:pos x="T42" y="T43"/>
+              </a:cxn>
+              <a:cxn ang="0">
+                <a:pos x="T44" y="T45"/>
+              </a:cxn>
+              <a:cxn ang="0">
+                <a:pos x="T46" y="T47"/>
+              </a:cxn>
+              <a:cxn ang="0">
+                <a:pos x="T48" y="T49"/>
+              </a:cxn>
+              <a:cxn ang="0">
+                <a:pos x="T50" y="T51"/>
+              </a:cxn>
+              <a:cxn ang="0">
+                <a:pos x="T52" y="T53"/>
+              </a:cxn>
+              <a:cxn ang="0">
+                <a:pos x="T54" y="T55"/>
+              </a:cxn>
+              <a:cxn ang="0">
+                <a:pos x="T56" y="T57"/>
+              </a:cxn>
+              <a:cxn ang="0">
+                <a:pos x="T58" y="T59"/>
+              </a:cxn>
+              <a:cxn ang="0">
+                <a:pos x="T60" y="T61"/>
+              </a:cxn>
+              <a:cxn ang="0">
+                <a:pos x="T62" y="T63"/>
+              </a:cxn>
+              <a:cxn ang="0">
+                <a:pos x="T64" y="T65"/>
+              </a:cxn>
+              <a:cxn ang="0">
+                <a:pos x="T66" y="T67"/>
+              </a:cxn>
+              <a:cxn ang="0">
+                <a:pos x="T68" y="T69"/>
+              </a:cxn>
+              <a:cxn ang="0">
+                <a:pos x="T70" y="T71"/>
+              </a:cxn>
+              <a:cxn ang="0">
+                <a:pos x="T72" y="T73"/>
+              </a:cxn>
+              <a:cxn ang="0">
+                <a:pos x="T74" y="T75"/>
+              </a:cxn>
+              <a:cxn ang="0">
+                <a:pos x="T76" y="T77"/>
+              </a:cxn>
+              <a:cxn ang="0">
+                <a:pos x="T78" y="T79"/>
+              </a:cxn>
+              <a:cxn ang="0">
+                <a:pos x="T80" y="T81"/>
+              </a:cxn>
+              <a:cxn ang="0">
+                <a:pos x="T82" y="T83"/>
+              </a:cxn>
+              <a:cxn ang="0">
+                <a:pos x="T84" y="T85"/>
+              </a:cxn>
+              <a:cxn ang="0">
+                <a:pos x="T86" y="T87"/>
+              </a:cxn>
+              <a:cxn ang="0">
+                <a:pos x="T88" y="T89"/>
+              </a:cxn>
+              <a:cxn ang="0">
+                <a:pos x="T90" y="T91"/>
+              </a:cxn>
+              <a:cxn ang="0">
+                <a:pos x="T92" y="T93"/>
+              </a:cxn>
+              <a:cxn ang="0">
+                <a:pos x="T94" y="T95"/>
+              </a:cxn>
+              <a:cxn ang="0">
+                <a:pos x="T96" y="T97"/>
+              </a:cxn>
+              <a:cxn ang="0">
+                <a:pos x="T98" y="T99"/>
+              </a:cxn>
+              <a:cxn ang="0">
+                <a:pos x="T100" y="T101"/>
+              </a:cxn>
+              <a:cxn ang="0">
+                <a:pos x="T102" y="T103"/>
+              </a:cxn>
+              <a:cxn ang="0">
+                <a:pos x="T104" y="T105"/>
+              </a:cxn>
+              <a:cxn ang="0">
+                <a:pos x="T106" y="T107"/>
+              </a:cxn>
+              <a:cxn ang="0">
+                <a:pos x="T108" y="T109"/>
+              </a:cxn>
+              <a:cxn ang="0">
+                <a:pos x="T110" y="T111"/>
+              </a:cxn>
+              <a:cxn ang="0">
+                <a:pos x="T112" y="T113"/>
+              </a:cxn>
+            </a:cxnLst>
+            <a:rect l="0" t="0" r="r" b="b"/>
+            <a:pathLst>
+              <a:path w="288" h="288">
+                <a:moveTo>
+                  <a:pt x="282" y="288"/>
+                </a:moveTo>
+                <a:cubicBezTo>
+                  <a:pt x="6" y="288"/>
+                  <a:pt x="6" y="288"/>
+                  <a:pt x="6" y="288"/>
+                </a:cubicBezTo>
+                <a:cubicBezTo>
+                  <a:pt x="2" y="288"/>
+                  <a:pt x="0" y="285"/>
+                  <a:pt x="0" y="282"/>
+                </a:cubicBezTo>
+                <a:cubicBezTo>
+                  <a:pt x="0" y="281"/>
+                  <a:pt x="0" y="256"/>
+                  <a:pt x="12" y="231"/>
+                </a:cubicBezTo>
+                <a:cubicBezTo>
+                  <a:pt x="21" y="213"/>
+                  <a:pt x="51" y="202"/>
+                  <a:pt x="93" y="187"/>
+                </a:cubicBezTo>
+                <a:cubicBezTo>
+                  <a:pt x="98" y="185"/>
+                  <a:pt x="103" y="183"/>
+                  <a:pt x="108" y="181"/>
+                </a:cubicBezTo>
+                <a:cubicBezTo>
+                  <a:pt x="108" y="152"/>
+                  <a:pt x="108" y="152"/>
+                  <a:pt x="108" y="152"/>
+                </a:cubicBezTo>
+                <a:cubicBezTo>
+                  <a:pt x="102" y="148"/>
+                  <a:pt x="91" y="136"/>
+                  <a:pt x="90" y="117"/>
+                </a:cubicBezTo>
+                <a:cubicBezTo>
+                  <a:pt x="87" y="115"/>
+                  <a:pt x="85" y="111"/>
+                  <a:pt x="84" y="106"/>
+                </a:cubicBezTo>
+                <a:cubicBezTo>
+                  <a:pt x="82" y="97"/>
+                  <a:pt x="83" y="87"/>
+                  <a:pt x="89" y="81"/>
+                </a:cubicBezTo>
+                <a:cubicBezTo>
+                  <a:pt x="89" y="80"/>
+                  <a:pt x="88" y="80"/>
+                  <a:pt x="88" y="79"/>
+                </a:cubicBezTo>
+                <a:cubicBezTo>
+                  <a:pt x="84" y="65"/>
+                  <a:pt x="77" y="40"/>
+                  <a:pt x="87" y="26"/>
+                </a:cubicBezTo>
+                <a:cubicBezTo>
+                  <a:pt x="91" y="21"/>
+                  <a:pt x="96" y="18"/>
+                  <a:pt x="104" y="18"/>
+                </a:cubicBezTo>
+                <a:cubicBezTo>
+                  <a:pt x="111" y="4"/>
+                  <a:pt x="135" y="0"/>
+                  <a:pt x="155" y="0"/>
+                </a:cubicBezTo>
+                <a:cubicBezTo>
+                  <a:pt x="178" y="1"/>
+                  <a:pt x="206" y="8"/>
+                  <a:pt x="210" y="28"/>
+                </a:cubicBezTo>
+                <a:cubicBezTo>
+                  <a:pt x="213" y="45"/>
+                  <a:pt x="204" y="67"/>
+                  <a:pt x="200" y="78"/>
+                </a:cubicBezTo>
+                <a:cubicBezTo>
+                  <a:pt x="199" y="79"/>
+                  <a:pt x="199" y="80"/>
+                  <a:pt x="199" y="81"/>
+                </a:cubicBezTo>
+                <a:cubicBezTo>
+                  <a:pt x="205" y="87"/>
+                  <a:pt x="206" y="97"/>
+                  <a:pt x="204" y="106"/>
+                </a:cubicBezTo>
+                <a:cubicBezTo>
+                  <a:pt x="202" y="111"/>
+                  <a:pt x="200" y="115"/>
+                  <a:pt x="198" y="117"/>
+                </a:cubicBezTo>
+                <a:cubicBezTo>
+                  <a:pt x="196" y="136"/>
+                  <a:pt x="185" y="148"/>
+                  <a:pt x="180" y="152"/>
+                </a:cubicBezTo>
+                <a:cubicBezTo>
+                  <a:pt x="180" y="181"/>
+                  <a:pt x="180" y="181"/>
+                  <a:pt x="180" y="181"/>
+                </a:cubicBezTo>
+                <a:cubicBezTo>
+                  <a:pt x="185" y="183"/>
+                  <a:pt x="190" y="185"/>
+                  <a:pt x="194" y="187"/>
+                </a:cubicBezTo>
+                <a:cubicBezTo>
+                  <a:pt x="236" y="202"/>
+                  <a:pt x="266" y="213"/>
+                  <a:pt x="275" y="231"/>
+                </a:cubicBezTo>
+                <a:cubicBezTo>
+                  <a:pt x="287" y="256"/>
+                  <a:pt x="288" y="281"/>
+                  <a:pt x="288" y="282"/>
+                </a:cubicBezTo>
+                <a:cubicBezTo>
+                  <a:pt x="288" y="285"/>
+                  <a:pt x="285" y="288"/>
+                  <a:pt x="282" y="288"/>
+                </a:cubicBezTo>
+                <a:close/>
+                <a:moveTo>
+                  <a:pt x="12" y="276"/>
+                </a:moveTo>
+                <a:cubicBezTo>
+                  <a:pt x="275" y="276"/>
+                  <a:pt x="275" y="276"/>
+                  <a:pt x="275" y="276"/>
+                </a:cubicBezTo>
+                <a:cubicBezTo>
+                  <a:pt x="274" y="268"/>
+                  <a:pt x="272" y="252"/>
+                  <a:pt x="264" y="236"/>
+                </a:cubicBezTo>
+                <a:cubicBezTo>
+                  <a:pt x="258" y="223"/>
+                  <a:pt x="226" y="211"/>
+                  <a:pt x="190" y="198"/>
+                </a:cubicBezTo>
+                <a:cubicBezTo>
+                  <a:pt x="184" y="196"/>
+                  <a:pt x="178" y="193"/>
+                  <a:pt x="172" y="191"/>
+                </a:cubicBezTo>
+                <a:cubicBezTo>
+                  <a:pt x="169" y="190"/>
+                  <a:pt x="168" y="188"/>
+                  <a:pt x="168" y="185"/>
+                </a:cubicBezTo>
+                <a:cubicBezTo>
+                  <a:pt x="168" y="149"/>
+                  <a:pt x="168" y="149"/>
+                  <a:pt x="168" y="149"/>
+                </a:cubicBezTo>
+                <a:cubicBezTo>
+                  <a:pt x="168" y="147"/>
+                  <a:pt x="169" y="145"/>
+                  <a:pt x="170" y="144"/>
+                </a:cubicBezTo>
+                <a:cubicBezTo>
+                  <a:pt x="171" y="144"/>
+                  <a:pt x="186" y="134"/>
+                  <a:pt x="186" y="113"/>
+                </a:cubicBezTo>
+                <a:cubicBezTo>
+                  <a:pt x="186" y="111"/>
+                  <a:pt x="188" y="108"/>
+                  <a:pt x="190" y="108"/>
+                </a:cubicBezTo>
+                <a:cubicBezTo>
+                  <a:pt x="191" y="106"/>
+                  <a:pt x="193" y="100"/>
+                  <a:pt x="192" y="95"/>
+                </a:cubicBezTo>
+                <a:cubicBezTo>
+                  <a:pt x="192" y="92"/>
+                  <a:pt x="191" y="90"/>
+                  <a:pt x="189" y="89"/>
+                </a:cubicBezTo>
+                <a:cubicBezTo>
+                  <a:pt x="187" y="88"/>
+                  <a:pt x="186" y="86"/>
+                  <a:pt x="186" y="83"/>
+                </a:cubicBezTo>
+                <a:cubicBezTo>
+                  <a:pt x="186" y="81"/>
+                  <a:pt x="187" y="79"/>
+                  <a:pt x="189" y="74"/>
+                </a:cubicBezTo>
+                <a:cubicBezTo>
+                  <a:pt x="193" y="63"/>
+                  <a:pt x="200" y="44"/>
+                  <a:pt x="198" y="31"/>
+                </a:cubicBezTo>
+                <a:cubicBezTo>
+                  <a:pt x="196" y="20"/>
+                  <a:pt x="178" y="13"/>
+                  <a:pt x="154" y="12"/>
+                </a:cubicBezTo>
+                <a:cubicBezTo>
+                  <a:pt x="131" y="11"/>
+                  <a:pt x="115" y="18"/>
+                  <a:pt x="113" y="25"/>
+                </a:cubicBezTo>
+                <a:cubicBezTo>
+                  <a:pt x="113" y="27"/>
+                  <a:pt x="110" y="29"/>
+                  <a:pt x="108" y="29"/>
+                </a:cubicBezTo>
+                <a:cubicBezTo>
+                  <a:pt x="102" y="29"/>
+                  <a:pt x="99" y="31"/>
+                  <a:pt x="97" y="34"/>
+                </a:cubicBezTo>
+                <a:cubicBezTo>
+                  <a:pt x="90" y="43"/>
+                  <a:pt x="97" y="66"/>
+                  <a:pt x="100" y="75"/>
+                </a:cubicBezTo>
+                <a:cubicBezTo>
+                  <a:pt x="101" y="80"/>
+                  <a:pt x="102" y="82"/>
+                  <a:pt x="102" y="83"/>
+                </a:cubicBezTo>
+                <a:cubicBezTo>
+                  <a:pt x="102" y="86"/>
+                  <a:pt x="100" y="88"/>
+                  <a:pt x="98" y="89"/>
+                </a:cubicBezTo>
+                <a:cubicBezTo>
+                  <a:pt x="96" y="90"/>
+                  <a:pt x="95" y="92"/>
+                  <a:pt x="95" y="95"/>
+                </a:cubicBezTo>
+                <a:cubicBezTo>
+                  <a:pt x="94" y="100"/>
+                  <a:pt x="96" y="106"/>
+                  <a:pt x="97" y="108"/>
+                </a:cubicBezTo>
+                <a:cubicBezTo>
+                  <a:pt x="100" y="108"/>
+                  <a:pt x="102" y="111"/>
+                  <a:pt x="102" y="113"/>
+                </a:cubicBezTo>
+                <a:cubicBezTo>
+                  <a:pt x="102" y="134"/>
+                  <a:pt x="117" y="144"/>
+                  <a:pt x="117" y="144"/>
+                </a:cubicBezTo>
+                <a:cubicBezTo>
+                  <a:pt x="119" y="145"/>
+                  <a:pt x="120" y="147"/>
+                  <a:pt x="120" y="149"/>
+                </a:cubicBezTo>
+                <a:cubicBezTo>
+                  <a:pt x="120" y="185"/>
+                  <a:pt x="120" y="185"/>
+                  <a:pt x="120" y="185"/>
+                </a:cubicBezTo>
+                <a:cubicBezTo>
+                  <a:pt x="120" y="188"/>
+                  <a:pt x="118" y="190"/>
+                  <a:pt x="116" y="191"/>
+                </a:cubicBezTo>
+                <a:cubicBezTo>
+                  <a:pt x="109" y="193"/>
+                  <a:pt x="103" y="196"/>
+                  <a:pt x="97" y="198"/>
+                </a:cubicBezTo>
+                <a:cubicBezTo>
+                  <a:pt x="61" y="211"/>
+                  <a:pt x="30" y="223"/>
+                  <a:pt x="23" y="236"/>
+                </a:cubicBezTo>
+                <a:cubicBezTo>
+                  <a:pt x="15" y="252"/>
+                  <a:pt x="13" y="268"/>
+                  <a:pt x="12" y="276"/>
+                </a:cubicBezTo>
+                <a:close/>
+              </a:path>
+            </a:pathLst>
+          </a:custGeom>
+          <a:solidFill>
+            <a:schemeClr val="tx2"/>
+          </a:solidFill>
+          <a:ln>
+            <a:noFill/>
+          </a:ln>
+        </p:spPr>
+        <p:txBody>
+          <a:bodyPr vert="horz" wrap="square" lIns="91440" tIns="45720" rIns="91440" bIns="45720" numCol="1" anchor="t" anchorCtr="0" compatLnSpc="1">
+            <a:prstTxWarp prst="textNoShape">
+              <a:avLst/>
+            </a:prstTxWarp>
+          </a:bodyPr>
+          <a:lstStyle/>
+          <a:p>
+            <a:endParaRPr lang="en-US" dirty="0">
+              <a:latin typeface="+mn-lt"/>
+            </a:endParaRPr>
+          </a:p>
+        </p:txBody>
+      </p:sp>
     </p:spTree>
     <p:extLst>
       <p:ext uri="{BB962C8B-B14F-4D97-AF65-F5344CB8AC3E}">
-        <p14:creationId xmlns:p14="http://schemas.microsoft.com/office/powerpoint/2010/main" val="2441154599"/>
+        <p14:creationId xmlns:p14="http://schemas.microsoft.com/office/powerpoint/2010/main" val="1786796278"/>
       </p:ext>
     </p:extLst>
   </p:cSld>

</xml_diff>